<commit_message>
added the deep learning project
</commit_message>
<xml_diff>
--- a/MS ADS.pptx
+++ b/MS ADS.pptx
@@ -5,7 +5,7 @@
     <p:sldMasterId id="2147483648" r:id="rId4"/>
   </p:sldMasterIdLst>
   <p:notesMasterIdLst>
-    <p:notesMasterId r:id="rId17"/>
+    <p:notesMasterId r:id="rId22"/>
   </p:notesMasterIdLst>
   <p:sldIdLst>
     <p:sldId id="256" r:id="rId5"/>
@@ -15,11 +15,16 @@
     <p:sldId id="260" r:id="rId9"/>
     <p:sldId id="275" r:id="rId10"/>
     <p:sldId id="261" r:id="rId11"/>
-    <p:sldId id="262" r:id="rId12"/>
-    <p:sldId id="263" r:id="rId13"/>
-    <p:sldId id="265" r:id="rId14"/>
-    <p:sldId id="257" r:id="rId15"/>
-    <p:sldId id="264" r:id="rId16"/>
+    <p:sldId id="279" r:id="rId12"/>
+    <p:sldId id="272" r:id="rId13"/>
+    <p:sldId id="277" r:id="rId14"/>
+    <p:sldId id="278" r:id="rId15"/>
+    <p:sldId id="262" r:id="rId16"/>
+    <p:sldId id="263" r:id="rId17"/>
+    <p:sldId id="265" r:id="rId18"/>
+    <p:sldId id="257" r:id="rId19"/>
+    <p:sldId id="264" r:id="rId20"/>
+    <p:sldId id="276" r:id="rId21"/>
   </p:sldIdLst>
   <p:sldSz cx="12192000" cy="6858000"/>
   <p:notesSz cx="6858000" cy="9144000"/>
@@ -7027,7 +7032,7 @@
           <a:p>
             <a:fld id="{C4EDFC01-9F45-445E-A8F1-81A112EE4F26}" type="datetimeFigureOut">
               <a:rPr lang="en-US" smtClean="0"/>
-              <a:t>3/8/2022</a:t>
+              <a:t>3/9/2022</a:t>
             </a:fld>
             <a:endParaRPr lang="en-US"/>
           </a:p>
@@ -7381,6 +7386,128 @@
 </p:notes>
 </file>
 
+<file path=ppt/notesSlides/notesSlide2.xml><?xml version="1.0" encoding="utf-8"?>
+<p:notes xmlns:a="http://schemas.openxmlformats.org/drawingml/2006/main" xmlns:r="http://schemas.openxmlformats.org/officeDocument/2006/relationships" xmlns:p="http://schemas.openxmlformats.org/presentationml/2006/main" showMasterSp="0" showMasterPhAnim="0">
+  <p:cSld>
+    <p:spTree>
+      <p:nvGrpSpPr>
+        <p:cNvPr id="1" name="Shape 222"/>
+        <p:cNvGrpSpPr/>
+        <p:nvPr/>
+      </p:nvGrpSpPr>
+      <p:grpSpPr>
+        <a:xfrm>
+          <a:off x="0" y="0"/>
+          <a:ext cx="0" cy="0"/>
+          <a:chOff x="0" y="0"/>
+          <a:chExt cx="0" cy="0"/>
+        </a:xfrm>
+      </p:grpSpPr>
+      <p:sp>
+        <p:nvSpPr>
+          <p:cNvPr id="223" name="Google Shape;223;p10:notes"/>
+          <p:cNvSpPr txBox="1">
+            <a:spLocks noGrp="1"/>
+          </p:cNvSpPr>
+          <p:nvPr>
+            <p:ph type="body" idx="1"/>
+          </p:nvPr>
+        </p:nvSpPr>
+        <p:spPr>
+          <a:xfrm>
+            <a:off x="685800" y="4343400"/>
+            <a:ext cx="5486400" cy="4114800"/>
+          </a:xfrm>
+          <a:prstGeom prst="rect">
+            <a:avLst/>
+          </a:prstGeom>
+          <a:noFill/>
+          <a:ln>
+            <a:noFill/>
+          </a:ln>
+        </p:spPr>
+        <p:txBody>
+          <a:bodyPr spcFirstLastPara="1" wrap="square" lIns="91425" tIns="91425" rIns="91425" bIns="91425" anchor="t" anchorCtr="0">
+            <a:noAutofit/>
+          </a:bodyPr>
+          <a:lstStyle/>
+          <a:p>
+            <a:pPr marL="0" lvl="0" indent="0" algn="l" rtl="0">
+              <a:lnSpc>
+                <a:spcPct val="100000"/>
+              </a:lnSpc>
+              <a:spcBef>
+                <a:spcPts val="0"/>
+              </a:spcBef>
+              <a:spcAft>
+                <a:spcPts val="0"/>
+              </a:spcAft>
+              <a:buSzPts val="1100"/>
+              <a:buNone/>
+            </a:pPr>
+            <a:endParaRPr/>
+          </a:p>
+        </p:txBody>
+      </p:sp>
+      <p:sp>
+        <p:nvSpPr>
+          <p:cNvPr id="224" name="Google Shape;224;p10:notes"/>
+          <p:cNvSpPr>
+            <a:spLocks noGrp="1" noRot="1" noChangeAspect="1"/>
+          </p:cNvSpPr>
+          <p:nvPr>
+            <p:ph type="sldImg" idx="2"/>
+          </p:nvPr>
+        </p:nvSpPr>
+        <p:spPr>
+          <a:xfrm>
+            <a:off x="381000" y="685800"/>
+            <a:ext cx="6096000" cy="3429000"/>
+          </a:xfrm>
+          <a:custGeom>
+            <a:avLst/>
+            <a:gdLst/>
+            <a:ahLst/>
+            <a:cxnLst/>
+            <a:rect l="l" t="t" r="r" b="b"/>
+            <a:pathLst>
+              <a:path w="120000" h="120000" extrusionOk="0">
+                <a:moveTo>
+                  <a:pt x="0" y="0"/>
+                </a:moveTo>
+                <a:lnTo>
+                  <a:pt x="120000" y="0"/>
+                </a:lnTo>
+                <a:lnTo>
+                  <a:pt x="120000" y="120000"/>
+                </a:lnTo>
+                <a:lnTo>
+                  <a:pt x="0" y="120000"/>
+                </a:lnTo>
+                <a:close/>
+              </a:path>
+            </a:pathLst>
+          </a:custGeom>
+          <a:noFill/>
+          <a:ln w="9525" cap="flat" cmpd="sng">
+            <a:solidFill>
+              <a:srgbClr val="000000"/>
+            </a:solidFill>
+            <a:prstDash val="solid"/>
+            <a:round/>
+            <a:headEnd type="none" w="sm" len="sm"/>
+            <a:tailEnd type="none" w="sm" len="sm"/>
+          </a:ln>
+        </p:spPr>
+      </p:sp>
+    </p:spTree>
+  </p:cSld>
+  <p:clrMapOvr>
+    <a:masterClrMapping/>
+  </p:clrMapOvr>
+</p:notes>
+</file>
+
 <file path=ppt/slideLayouts/slideLayout1.xml><?xml version="1.0" encoding="utf-8"?>
 <p:sldLayout xmlns:a="http://schemas.openxmlformats.org/drawingml/2006/main" xmlns:r="http://schemas.openxmlformats.org/officeDocument/2006/relationships" xmlns:p="http://schemas.openxmlformats.org/presentationml/2006/main" type="title" preserve="1">
   <p:cSld name="Title Slide">
@@ -7528,7 +7655,7 @@
           <a:p>
             <a:fld id="{43C97625-BF87-4FD9-B6A3-7784DB263167}" type="datetimeFigureOut">
               <a:rPr lang="en-US" smtClean="0"/>
-              <a:t>3/8/2022</a:t>
+              <a:t>3/9/2022</a:t>
             </a:fld>
             <a:endParaRPr lang="en-US"/>
           </a:p>
@@ -7726,7 +7853,7 @@
           <a:p>
             <a:fld id="{43C97625-BF87-4FD9-B6A3-7784DB263167}" type="datetimeFigureOut">
               <a:rPr lang="en-US" smtClean="0"/>
-              <a:t>3/8/2022</a:t>
+              <a:t>3/9/2022</a:t>
             </a:fld>
             <a:endParaRPr lang="en-US"/>
           </a:p>
@@ -7934,7 +8061,7 @@
           <a:p>
             <a:fld id="{43C97625-BF87-4FD9-B6A3-7784DB263167}" type="datetimeFigureOut">
               <a:rPr lang="en-US" smtClean="0"/>
-              <a:t>3/8/2022</a:t>
+              <a:t>3/9/2022</a:t>
             </a:fld>
             <a:endParaRPr lang="en-US"/>
           </a:p>
@@ -8132,7 +8259,7 @@
           <a:p>
             <a:fld id="{43C97625-BF87-4FD9-B6A3-7784DB263167}" type="datetimeFigureOut">
               <a:rPr lang="en-US" smtClean="0"/>
-              <a:t>3/8/2022</a:t>
+              <a:t>3/9/2022</a:t>
             </a:fld>
             <a:endParaRPr lang="en-US"/>
           </a:p>
@@ -8407,7 +8534,7 @@
           <a:p>
             <a:fld id="{43C97625-BF87-4FD9-B6A3-7784DB263167}" type="datetimeFigureOut">
               <a:rPr lang="en-US" smtClean="0"/>
-              <a:t>3/8/2022</a:t>
+              <a:t>3/9/2022</a:t>
             </a:fld>
             <a:endParaRPr lang="en-US"/>
           </a:p>
@@ -8672,7 +8799,7 @@
           <a:p>
             <a:fld id="{43C97625-BF87-4FD9-B6A3-7784DB263167}" type="datetimeFigureOut">
               <a:rPr lang="en-US" smtClean="0"/>
-              <a:t>3/8/2022</a:t>
+              <a:t>3/9/2022</a:t>
             </a:fld>
             <a:endParaRPr lang="en-US"/>
           </a:p>
@@ -9084,7 +9211,7 @@
           <a:p>
             <a:fld id="{43C97625-BF87-4FD9-B6A3-7784DB263167}" type="datetimeFigureOut">
               <a:rPr lang="en-US" smtClean="0"/>
-              <a:t>3/8/2022</a:t>
+              <a:t>3/9/2022</a:t>
             </a:fld>
             <a:endParaRPr lang="en-US"/>
           </a:p>
@@ -9225,7 +9352,7 @@
           <a:p>
             <a:fld id="{43C97625-BF87-4FD9-B6A3-7784DB263167}" type="datetimeFigureOut">
               <a:rPr lang="en-US" smtClean="0"/>
-              <a:t>3/8/2022</a:t>
+              <a:t>3/9/2022</a:t>
             </a:fld>
             <a:endParaRPr lang="en-US"/>
           </a:p>
@@ -9338,7 +9465,7 @@
           <a:p>
             <a:fld id="{43C97625-BF87-4FD9-B6A3-7784DB263167}" type="datetimeFigureOut">
               <a:rPr lang="en-US" smtClean="0"/>
-              <a:t>3/8/2022</a:t>
+              <a:t>3/9/2022</a:t>
             </a:fld>
             <a:endParaRPr lang="en-US"/>
           </a:p>
@@ -9649,7 +9776,7 @@
           <a:p>
             <a:fld id="{43C97625-BF87-4FD9-B6A3-7784DB263167}" type="datetimeFigureOut">
               <a:rPr lang="en-US" smtClean="0"/>
-              <a:t>3/8/2022</a:t>
+              <a:t>3/9/2022</a:t>
             </a:fld>
             <a:endParaRPr lang="en-US"/>
           </a:p>
@@ -9937,7 +10064,7 @@
           <a:p>
             <a:fld id="{43C97625-BF87-4FD9-B6A3-7784DB263167}" type="datetimeFigureOut">
               <a:rPr lang="en-US" smtClean="0"/>
-              <a:t>3/8/2022</a:t>
+              <a:t>3/9/2022</a:t>
             </a:fld>
             <a:endParaRPr lang="en-US"/>
           </a:p>
@@ -10178,7 +10305,7 @@
           <a:p>
             <a:fld id="{43C97625-BF87-4FD9-B6A3-7784DB263167}" type="datetimeFigureOut">
               <a:rPr lang="en-US" smtClean="0"/>
-              <a:t>3/8/2022</a:t>
+              <a:t>3/9/2022</a:t>
             </a:fld>
             <a:endParaRPr lang="en-US"/>
           </a:p>
@@ -10701,6 +10828,440 @@
           <p:cNvPr id="2" name="Title 1">
             <a:extLst>
               <a:ext uri="{FF2B5EF4-FFF2-40B4-BE49-F238E27FC236}">
+                <a16:creationId xmlns:a16="http://schemas.microsoft.com/office/drawing/2014/main" id="{4ACD82AF-E99B-4559-9B09-9E8EA17FC079}"/>
+              </a:ext>
+            </a:extLst>
+          </p:cNvPr>
+          <p:cNvSpPr>
+            <a:spLocks noGrp="1"/>
+          </p:cNvSpPr>
+          <p:nvPr>
+            <p:ph type="title"/>
+          </p:nvPr>
+        </p:nvSpPr>
+        <p:spPr/>
+        <p:txBody>
+          <a:bodyPr/>
+          <a:lstStyle/>
+          <a:p>
+            <a:r>
+              <a:rPr lang="en-US" dirty="0"/>
+              <a:t>Model loss and accuracy (EfficientNetB6)</a:t>
+            </a:r>
+          </a:p>
+        </p:txBody>
+      </p:sp>
+      <p:pic>
+        <p:nvPicPr>
+          <p:cNvPr id="5" name="Picture 4">
+            <a:extLst>
+              <a:ext uri="{FF2B5EF4-FFF2-40B4-BE49-F238E27FC236}">
+                <a16:creationId xmlns:a16="http://schemas.microsoft.com/office/drawing/2014/main" id="{925E44CA-B49A-4CCB-A344-E3D38DD1E371}"/>
+              </a:ext>
+            </a:extLst>
+          </p:cNvPr>
+          <p:cNvPicPr>
+            <a:picLocks noChangeAspect="1"/>
+          </p:cNvPicPr>
+          <p:nvPr/>
+        </p:nvPicPr>
+        <p:blipFill>
+          <a:blip r:embed="rId2"/>
+          <a:stretch>
+            <a:fillRect/>
+          </a:stretch>
+        </p:blipFill>
+        <p:spPr>
+          <a:xfrm>
+            <a:off x="585611" y="1862384"/>
+            <a:ext cx="5144609" cy="4100653"/>
+          </a:xfrm>
+          <a:prstGeom prst="rect">
+            <a:avLst/>
+          </a:prstGeom>
+        </p:spPr>
+      </p:pic>
+      <p:pic>
+        <p:nvPicPr>
+          <p:cNvPr id="7" name="Picture 6">
+            <a:extLst>
+              <a:ext uri="{FF2B5EF4-FFF2-40B4-BE49-F238E27FC236}">
+                <a16:creationId xmlns:a16="http://schemas.microsoft.com/office/drawing/2014/main" id="{79F572A3-AD12-466E-B4B9-FE9CF4B4265F}"/>
+              </a:ext>
+            </a:extLst>
+          </p:cNvPr>
+          <p:cNvPicPr>
+            <a:picLocks noChangeAspect="1"/>
+          </p:cNvPicPr>
+          <p:nvPr/>
+        </p:nvPicPr>
+        <p:blipFill>
+          <a:blip r:embed="rId3"/>
+          <a:stretch>
+            <a:fillRect/>
+          </a:stretch>
+        </p:blipFill>
+        <p:spPr>
+          <a:xfrm>
+            <a:off x="6461781" y="1877330"/>
+            <a:ext cx="5579672" cy="4085707"/>
+          </a:xfrm>
+          <a:prstGeom prst="rect">
+            <a:avLst/>
+          </a:prstGeom>
+        </p:spPr>
+      </p:pic>
+    </p:spTree>
+    <p:extLst>
+      <p:ext uri="{BB962C8B-B14F-4D97-AF65-F5344CB8AC3E}">
+        <p14:creationId xmlns:p14="http://schemas.microsoft.com/office/powerpoint/2010/main" val="3496013745"/>
+      </p:ext>
+    </p:extLst>
+  </p:cSld>
+  <p:clrMapOvr>
+    <a:masterClrMapping/>
+  </p:clrMapOvr>
+</p:sld>
+</file>
+
+<file path=ppt/slides/slide11.xml><?xml version="1.0" encoding="utf-8"?>
+<p:sld xmlns:a="http://schemas.openxmlformats.org/drawingml/2006/main" xmlns:r="http://schemas.openxmlformats.org/officeDocument/2006/relationships" xmlns:p="http://schemas.openxmlformats.org/presentationml/2006/main">
+  <p:cSld>
+    <p:spTree>
+      <p:nvGrpSpPr>
+        <p:cNvPr id="1" name=""/>
+        <p:cNvGrpSpPr/>
+        <p:nvPr/>
+      </p:nvGrpSpPr>
+      <p:grpSpPr>
+        <a:xfrm>
+          <a:off x="0" y="0"/>
+          <a:ext cx="0" cy="0"/>
+          <a:chOff x="0" y="0"/>
+          <a:chExt cx="0" cy="0"/>
+        </a:xfrm>
+      </p:grpSpPr>
+      <p:sp>
+        <p:nvSpPr>
+          <p:cNvPr id="2" name="Title 1">
+            <a:extLst>
+              <a:ext uri="{FF2B5EF4-FFF2-40B4-BE49-F238E27FC236}">
+                <a16:creationId xmlns:a16="http://schemas.microsoft.com/office/drawing/2014/main" id="{CB5A6CEB-E25F-4184-BCD7-E1DC0EDC36D6}"/>
+              </a:ext>
+            </a:extLst>
+          </p:cNvPr>
+          <p:cNvSpPr>
+            <a:spLocks noGrp="1"/>
+          </p:cNvSpPr>
+          <p:nvPr>
+            <p:ph type="title"/>
+          </p:nvPr>
+        </p:nvSpPr>
+        <p:spPr/>
+        <p:txBody>
+          <a:bodyPr/>
+          <a:lstStyle/>
+          <a:p>
+            <a:r>
+              <a:rPr lang="en-US" dirty="0"/>
+              <a:t>Learnings</a:t>
+            </a:r>
+          </a:p>
+        </p:txBody>
+      </p:sp>
+      <p:sp>
+        <p:nvSpPr>
+          <p:cNvPr id="3" name="Content Placeholder 2">
+            <a:extLst>
+              <a:ext uri="{FF2B5EF4-FFF2-40B4-BE49-F238E27FC236}">
+                <a16:creationId xmlns:a16="http://schemas.microsoft.com/office/drawing/2014/main" id="{CF175237-8FCD-414B-A2D3-9FAD1A96E5D0}"/>
+              </a:ext>
+            </a:extLst>
+          </p:cNvPr>
+          <p:cNvSpPr>
+            <a:spLocks noGrp="1"/>
+          </p:cNvSpPr>
+          <p:nvPr>
+            <p:ph idx="1"/>
+          </p:nvPr>
+        </p:nvSpPr>
+        <p:spPr/>
+        <p:txBody>
+          <a:bodyPr/>
+          <a:lstStyle/>
+          <a:p>
+            <a:pPr lvl="1"/>
+            <a:r>
+              <a:rPr lang="en-US" dirty="0"/>
+              <a:t>Exploratory data analysis</a:t>
+            </a:r>
+          </a:p>
+          <a:p>
+            <a:pPr lvl="1"/>
+            <a:r>
+              <a:rPr lang="en-US" dirty="0"/>
+              <a:t>Building and cleaning datasets</a:t>
+            </a:r>
+          </a:p>
+          <a:p>
+            <a:pPr lvl="1"/>
+            <a:r>
+              <a:rPr lang="en-US" dirty="0"/>
+              <a:t>Understanding of deep learning concepts</a:t>
+            </a:r>
+          </a:p>
+          <a:p>
+            <a:pPr lvl="1"/>
+            <a:r>
+              <a:rPr lang="en-US" dirty="0"/>
+              <a:t>Tools like </a:t>
+            </a:r>
+            <a:r>
+              <a:rPr lang="en-US" dirty="0" err="1"/>
+              <a:t>Jupyter</a:t>
+            </a:r>
+            <a:r>
+              <a:rPr lang="en-US" dirty="0"/>
+              <a:t> notebooks</a:t>
+            </a:r>
+          </a:p>
+          <a:p>
+            <a:pPr lvl="1"/>
+            <a:r>
+              <a:rPr lang="en-US" dirty="0"/>
+              <a:t>Understanding the concepts of transfer learnings</a:t>
+            </a:r>
+          </a:p>
+          <a:p>
+            <a:pPr lvl="1"/>
+            <a:r>
+              <a:rPr lang="en-US" dirty="0"/>
+              <a:t>TensorFlow 2.0 framework</a:t>
+            </a:r>
+          </a:p>
+          <a:p>
+            <a:pPr lvl="1"/>
+            <a:r>
+              <a:rPr lang="en-US" dirty="0"/>
+              <a:t>Large data processing. Test small iterations before going big.</a:t>
+            </a:r>
+          </a:p>
+          <a:p>
+            <a:pPr lvl="2"/>
+            <a:r>
+              <a:rPr lang="en-US" dirty="0"/>
+              <a:t>Stratified sampling was a big help.</a:t>
+            </a:r>
+          </a:p>
+        </p:txBody>
+      </p:sp>
+    </p:spTree>
+    <p:extLst>
+      <p:ext uri="{BB962C8B-B14F-4D97-AF65-F5344CB8AC3E}">
+        <p14:creationId xmlns:p14="http://schemas.microsoft.com/office/powerpoint/2010/main" val="1258006793"/>
+      </p:ext>
+    </p:extLst>
+  </p:cSld>
+  <p:clrMapOvr>
+    <a:masterClrMapping/>
+  </p:clrMapOvr>
+</p:sld>
+</file>
+
+<file path=ppt/slides/slide12.xml><?xml version="1.0" encoding="utf-8"?>
+<p:sld xmlns:a="http://schemas.openxmlformats.org/drawingml/2006/main" xmlns:r="http://schemas.openxmlformats.org/officeDocument/2006/relationships" xmlns:p="http://schemas.openxmlformats.org/presentationml/2006/main">
+  <p:cSld>
+    <p:spTree>
+      <p:nvGrpSpPr>
+        <p:cNvPr id="1" name=""/>
+        <p:cNvGrpSpPr/>
+        <p:nvPr/>
+      </p:nvGrpSpPr>
+      <p:grpSpPr>
+        <a:xfrm>
+          <a:off x="0" y="0"/>
+          <a:ext cx="0" cy="0"/>
+          <a:chOff x="0" y="0"/>
+          <a:chExt cx="0" cy="0"/>
+        </a:xfrm>
+      </p:grpSpPr>
+      <p:sp>
+        <p:nvSpPr>
+          <p:cNvPr id="2" name="Title 1">
+            <a:extLst>
+              <a:ext uri="{FF2B5EF4-FFF2-40B4-BE49-F238E27FC236}">
+                <a16:creationId xmlns:a16="http://schemas.microsoft.com/office/drawing/2014/main" id="{A5605D23-E4FD-4D7D-A927-2844A0CA0E55}"/>
+              </a:ext>
+            </a:extLst>
+          </p:cNvPr>
+          <p:cNvSpPr>
+            <a:spLocks noGrp="1"/>
+          </p:cNvSpPr>
+          <p:nvPr>
+            <p:ph type="title"/>
+          </p:nvPr>
+        </p:nvSpPr>
+        <p:spPr/>
+        <p:txBody>
+          <a:bodyPr/>
+          <a:lstStyle/>
+          <a:p>
+            <a:r>
+              <a:rPr lang="en-US" dirty="0"/>
+              <a:t>Project3: Sony Rules Gaming </a:t>
+            </a:r>
+          </a:p>
+        </p:txBody>
+      </p:sp>
+      <p:sp>
+        <p:nvSpPr>
+          <p:cNvPr id="3" name="Content Placeholder 2">
+            <a:extLst>
+              <a:ext uri="{FF2B5EF4-FFF2-40B4-BE49-F238E27FC236}">
+                <a16:creationId xmlns:a16="http://schemas.microsoft.com/office/drawing/2014/main" id="{2480F6F5-6228-40F3-8E8F-458857746077}"/>
+              </a:ext>
+            </a:extLst>
+          </p:cNvPr>
+          <p:cNvSpPr>
+            <a:spLocks noGrp="1"/>
+          </p:cNvSpPr>
+          <p:nvPr>
+            <p:ph idx="1"/>
+          </p:nvPr>
+        </p:nvSpPr>
+        <p:spPr/>
+        <p:txBody>
+          <a:bodyPr/>
+          <a:lstStyle/>
+          <a:p>
+            <a:endParaRPr lang="en-US"/>
+          </a:p>
+        </p:txBody>
+      </p:sp>
+    </p:spTree>
+    <p:extLst>
+      <p:ext uri="{BB962C8B-B14F-4D97-AF65-F5344CB8AC3E}">
+        <p14:creationId xmlns:p14="http://schemas.microsoft.com/office/powerpoint/2010/main" val="3119184983"/>
+      </p:ext>
+    </p:extLst>
+  </p:cSld>
+  <p:clrMapOvr>
+    <a:masterClrMapping/>
+  </p:clrMapOvr>
+</p:sld>
+</file>
+
+<file path=ppt/slides/slide13.xml><?xml version="1.0" encoding="utf-8"?>
+<p:sld xmlns:a="http://schemas.openxmlformats.org/drawingml/2006/main" xmlns:r="http://schemas.openxmlformats.org/officeDocument/2006/relationships" xmlns:p="http://schemas.openxmlformats.org/presentationml/2006/main">
+  <p:cSld>
+    <p:spTree>
+      <p:nvGrpSpPr>
+        <p:cNvPr id="1" name=""/>
+        <p:cNvGrpSpPr/>
+        <p:nvPr/>
+      </p:nvGrpSpPr>
+      <p:grpSpPr>
+        <a:xfrm>
+          <a:off x="0" y="0"/>
+          <a:ext cx="0" cy="0"/>
+          <a:chOff x="0" y="0"/>
+          <a:chExt cx="0" cy="0"/>
+        </a:xfrm>
+      </p:grpSpPr>
+      <p:sp>
+        <p:nvSpPr>
+          <p:cNvPr id="2" name="Title 1">
+            <a:extLst>
+              <a:ext uri="{FF2B5EF4-FFF2-40B4-BE49-F238E27FC236}">
+                <a16:creationId xmlns:a16="http://schemas.microsoft.com/office/drawing/2014/main" id="{A5605D23-E4FD-4D7D-A927-2844A0CA0E55}"/>
+              </a:ext>
+            </a:extLst>
+          </p:cNvPr>
+          <p:cNvSpPr>
+            <a:spLocks noGrp="1"/>
+          </p:cNvSpPr>
+          <p:nvPr>
+            <p:ph type="title"/>
+          </p:nvPr>
+        </p:nvSpPr>
+        <p:spPr/>
+        <p:txBody>
+          <a:bodyPr>
+            <a:normAutofit/>
+          </a:bodyPr>
+          <a:lstStyle/>
+          <a:p>
+            <a:r>
+              <a:rPr lang="en-US" dirty="0">
+                <a:latin typeface="Calibri" panose="020F0502020204030204" pitchFamily="34" charset="0"/>
+                <a:cs typeface="Times New Roman" panose="02020603050405020304" pitchFamily="18" charset="0"/>
+              </a:rPr>
+              <a:t>Hands-on experience  on modern Databases</a:t>
+            </a:r>
+            <a:endParaRPr lang="en-US" dirty="0"/>
+          </a:p>
+        </p:txBody>
+      </p:sp>
+      <p:sp>
+        <p:nvSpPr>
+          <p:cNvPr id="3" name="Content Placeholder 2">
+            <a:extLst>
+              <a:ext uri="{FF2B5EF4-FFF2-40B4-BE49-F238E27FC236}">
+                <a16:creationId xmlns:a16="http://schemas.microsoft.com/office/drawing/2014/main" id="{2480F6F5-6228-40F3-8E8F-458857746077}"/>
+              </a:ext>
+            </a:extLst>
+          </p:cNvPr>
+          <p:cNvSpPr>
+            <a:spLocks noGrp="1"/>
+          </p:cNvSpPr>
+          <p:nvPr>
+            <p:ph idx="1"/>
+          </p:nvPr>
+        </p:nvSpPr>
+        <p:spPr/>
+        <p:txBody>
+          <a:bodyPr/>
+          <a:lstStyle/>
+          <a:p>
+            <a:endParaRPr lang="en-US" dirty="0"/>
+          </a:p>
+        </p:txBody>
+      </p:sp>
+    </p:spTree>
+    <p:extLst>
+      <p:ext uri="{BB962C8B-B14F-4D97-AF65-F5344CB8AC3E}">
+        <p14:creationId xmlns:p14="http://schemas.microsoft.com/office/powerpoint/2010/main" val="2782192091"/>
+      </p:ext>
+    </p:extLst>
+  </p:cSld>
+  <p:clrMapOvr>
+    <a:masterClrMapping/>
+  </p:clrMapOvr>
+</p:sld>
+</file>
+
+<file path=ppt/slides/slide14.xml><?xml version="1.0" encoding="utf-8"?>
+<p:sld xmlns:a="http://schemas.openxmlformats.org/drawingml/2006/main" xmlns:r="http://schemas.openxmlformats.org/officeDocument/2006/relationships" xmlns:p="http://schemas.openxmlformats.org/presentationml/2006/main">
+  <p:cSld>
+    <p:spTree>
+      <p:nvGrpSpPr>
+        <p:cNvPr id="1" name=""/>
+        <p:cNvGrpSpPr/>
+        <p:nvPr/>
+      </p:nvGrpSpPr>
+      <p:grpSpPr>
+        <a:xfrm>
+          <a:off x="0" y="0"/>
+          <a:ext cx="0" cy="0"/>
+          <a:chOff x="0" y="0"/>
+          <a:chExt cx="0" cy="0"/>
+        </a:xfrm>
+      </p:grpSpPr>
+      <p:sp>
+        <p:nvSpPr>
+          <p:cNvPr id="2" name="Title 1">
+            <a:extLst>
+              <a:ext uri="{FF2B5EF4-FFF2-40B4-BE49-F238E27FC236}">
                 <a16:creationId xmlns:a16="http://schemas.microsoft.com/office/drawing/2014/main" id="{3AEBD1CD-DD21-4EDC-951A-878B01CB6240}"/>
               </a:ext>
             </a:extLst>
@@ -10762,7 +11323,7 @@
 </p:sld>
 </file>
 
-<file path=ppt/slides/slide11.xml><?xml version="1.0" encoding="utf-8"?>
+<file path=ppt/slides/slide15.xml><?xml version="1.0" encoding="utf-8"?>
 <p:sld xmlns:a="http://schemas.openxmlformats.org/drawingml/2006/main" xmlns:r="http://schemas.openxmlformats.org/officeDocument/2006/relationships" xmlns:p="http://schemas.openxmlformats.org/presentationml/2006/main">
   <p:cSld>
     <p:spTree>
@@ -11110,7 +11671,7 @@
 </p:sld>
 </file>
 
-<file path=ppt/slides/slide12.xml><?xml version="1.0" encoding="utf-8"?>
+<file path=ppt/slides/slide16.xml><?xml version="1.0" encoding="utf-8"?>
 <p:sld xmlns:a="http://schemas.openxmlformats.org/drawingml/2006/main" xmlns:r="http://schemas.openxmlformats.org/officeDocument/2006/relationships" xmlns:p="http://schemas.openxmlformats.org/presentationml/2006/main">
   <p:cSld>
     <p:spTree>
@@ -11184,6 +11745,117 @@
     <p:extLst>
       <p:ext uri="{BB962C8B-B14F-4D97-AF65-F5344CB8AC3E}">
         <p14:creationId xmlns:p14="http://schemas.microsoft.com/office/powerpoint/2010/main" val="495522130"/>
+      </p:ext>
+    </p:extLst>
+  </p:cSld>
+  <p:clrMapOvr>
+    <a:masterClrMapping/>
+  </p:clrMapOvr>
+</p:sld>
+</file>
+
+<file path=ppt/slides/slide17.xml><?xml version="1.0" encoding="utf-8"?>
+<p:sld xmlns:a="http://schemas.openxmlformats.org/drawingml/2006/main" xmlns:r="http://schemas.openxmlformats.org/officeDocument/2006/relationships" xmlns:p="http://schemas.openxmlformats.org/presentationml/2006/main">
+  <p:cSld>
+    <p:spTree>
+      <p:nvGrpSpPr>
+        <p:cNvPr id="1" name=""/>
+        <p:cNvGrpSpPr/>
+        <p:nvPr/>
+      </p:nvGrpSpPr>
+      <p:grpSpPr>
+        <a:xfrm>
+          <a:off x="0" y="0"/>
+          <a:ext cx="0" cy="0"/>
+          <a:chOff x="0" y="0"/>
+          <a:chExt cx="0" cy="0"/>
+        </a:xfrm>
+      </p:grpSpPr>
+      <p:sp>
+        <p:nvSpPr>
+          <p:cNvPr id="2" name="Title 1">
+            <a:extLst>
+              <a:ext uri="{FF2B5EF4-FFF2-40B4-BE49-F238E27FC236}">
+                <a16:creationId xmlns:a16="http://schemas.microsoft.com/office/drawing/2014/main" id="{154C7686-BCF0-4CAA-A44C-A64B8189EDCE}"/>
+              </a:ext>
+            </a:extLst>
+          </p:cNvPr>
+          <p:cNvSpPr>
+            <a:spLocks noGrp="1"/>
+          </p:cNvSpPr>
+          <p:nvPr>
+            <p:ph type="title"/>
+          </p:nvPr>
+        </p:nvSpPr>
+        <p:spPr/>
+        <p:txBody>
+          <a:bodyPr/>
+          <a:lstStyle/>
+          <a:p>
+            <a:r>
+              <a:rPr lang="en-US" dirty="0"/>
+              <a:t>References</a:t>
+            </a:r>
+          </a:p>
+        </p:txBody>
+      </p:sp>
+      <p:sp>
+        <p:nvSpPr>
+          <p:cNvPr id="3" name="Content Placeholder 2">
+            <a:extLst>
+              <a:ext uri="{FF2B5EF4-FFF2-40B4-BE49-F238E27FC236}">
+                <a16:creationId xmlns:a16="http://schemas.microsoft.com/office/drawing/2014/main" id="{30CCB72A-A945-463C-96D6-CECCCC113A42}"/>
+              </a:ext>
+            </a:extLst>
+          </p:cNvPr>
+          <p:cNvSpPr>
+            <a:spLocks noGrp="1"/>
+          </p:cNvSpPr>
+          <p:nvPr>
+            <p:ph idx="1"/>
+          </p:nvPr>
+        </p:nvSpPr>
+        <p:spPr/>
+        <p:txBody>
+          <a:bodyPr/>
+          <a:lstStyle/>
+          <a:p>
+            <a:r>
+              <a:rPr lang="en-US" dirty="0"/>
+              <a:t>HPA Kaggle competition: </a:t>
+            </a:r>
+            <a:r>
+              <a:rPr lang="en-US" sz="1800" u="sng" dirty="0">
+                <a:solidFill>
+                  <a:srgbClr val="0563C1"/>
+                </a:solidFill>
+                <a:effectLst/>
+                <a:latin typeface="Calibri" panose="020F0502020204030204" pitchFamily="34" charset="0"/>
+                <a:ea typeface="Calibri" panose="020F0502020204030204" pitchFamily="34" charset="0"/>
+                <a:cs typeface="Times New Roman" panose="02020603050405020304" pitchFamily="18" charset="0"/>
+                <a:hlinkClick r:id="rId2"/>
+              </a:rPr>
+              <a:t>https://www.kaggle.com/c/hpa-single-cell-image-classification</a:t>
+            </a:r>
+            <a:endParaRPr lang="en-US" sz="1800" u="sng" dirty="0">
+              <a:solidFill>
+                <a:srgbClr val="0563C1"/>
+              </a:solidFill>
+              <a:effectLst/>
+              <a:latin typeface="Calibri" panose="020F0502020204030204" pitchFamily="34" charset="0"/>
+              <a:ea typeface="Calibri" panose="020F0502020204030204" pitchFamily="34" charset="0"/>
+              <a:cs typeface="Times New Roman" panose="02020603050405020304" pitchFamily="18" charset="0"/>
+            </a:endParaRPr>
+          </a:p>
+          <a:p>
+            <a:endParaRPr lang="en-US" dirty="0"/>
+          </a:p>
+        </p:txBody>
+      </p:sp>
+    </p:spTree>
+    <p:extLst>
+      <p:ext uri="{BB962C8B-B14F-4D97-AF65-F5344CB8AC3E}">
+        <p14:creationId xmlns:p14="http://schemas.microsoft.com/office/powerpoint/2010/main" val="1626168686"/>
       </p:ext>
     </p:extLst>
   </p:cSld>
@@ -14987,12 +15659,72 @@
             <p:ph idx="1"/>
           </p:nvPr>
         </p:nvSpPr>
-        <p:spPr/>
+        <p:spPr>
+          <a:xfrm>
+            <a:off x="838200" y="1825625"/>
+            <a:ext cx="10515600" cy="4667250"/>
+          </a:xfrm>
+        </p:spPr>
         <p:txBody>
-          <a:bodyPr/>
+          <a:bodyPr>
+            <a:normAutofit/>
+          </a:bodyPr>
           <a:lstStyle/>
           <a:p>
-            <a:endParaRPr lang="en-US" dirty="0"/>
+            <a:r>
+              <a:rPr lang="en-US" dirty="0"/>
+              <a:t>Objective: </a:t>
+            </a:r>
+            <a:r>
+              <a:rPr lang="en-US" sz="2800" dirty="0">
+                <a:highlight>
+                  <a:srgbClr val="FFFFFF"/>
+                </a:highlight>
+              </a:rPr>
+              <a:t>To develop models capable of classifying mixed patterns of proteins in microscopic images</a:t>
+            </a:r>
+          </a:p>
+          <a:p>
+            <a:pPr lvl="1"/>
+            <a:r>
+              <a:rPr lang="en-US" dirty="0">
+                <a:highlight>
+                  <a:srgbClr val="FFFFFF"/>
+                </a:highlight>
+              </a:rPr>
+              <a:t>Kaggle competition</a:t>
+            </a:r>
+          </a:p>
+          <a:p>
+            <a:pPr lvl="1"/>
+            <a:r>
+              <a:rPr lang="en-US" dirty="0">
+                <a:highlight>
+                  <a:srgbClr val="FFFFFF"/>
+                </a:highlight>
+              </a:rPr>
+              <a:t>Paired with another classmate to do the project</a:t>
+            </a:r>
+          </a:p>
+          <a:p>
+            <a:r>
+              <a:rPr lang="en-US" dirty="0">
+                <a:highlight>
+                  <a:srgbClr val="FFFFFF"/>
+                </a:highlight>
+              </a:rPr>
+              <a:t>About 19 cell types are given</a:t>
+            </a:r>
+          </a:p>
+          <a:p>
+            <a:r>
+              <a:rPr lang="en-US" dirty="0">
+                <a:highlight>
+                  <a:srgbClr val="FFFFFF"/>
+                </a:highlight>
+              </a:rPr>
+              <a:t>Leaderboard at the time was about 44% success rate and our goal for the project is to get above 44% accuracy in classification</a:t>
+            </a:r>
           </a:p>
         </p:txBody>
       </p:sp>
@@ -15031,7 +15763,7 @@
           <p:cNvPr id="2" name="Title 1">
             <a:extLst>
               <a:ext uri="{FF2B5EF4-FFF2-40B4-BE49-F238E27FC236}">
-                <a16:creationId xmlns:a16="http://schemas.microsoft.com/office/drawing/2014/main" id="{A5605D23-E4FD-4D7D-A927-2844A0CA0E55}"/>
+                <a16:creationId xmlns:a16="http://schemas.microsoft.com/office/drawing/2014/main" id="{80CDEA9D-168F-4424-AA81-DCA9E41151D2}"/>
               </a:ext>
             </a:extLst>
           </p:cNvPr>
@@ -15049,7 +15781,7 @@
           <a:p>
             <a:r>
               <a:rPr lang="en-US" dirty="0"/>
-              <a:t>Project3: Sony Rules Gaming </a:t>
+              <a:t>Project approach</a:t>
             </a:r>
           </a:p>
         </p:txBody>
@@ -15059,7 +15791,7 @@
           <p:cNvPr id="3" name="Content Placeholder 2">
             <a:extLst>
               <a:ext uri="{FF2B5EF4-FFF2-40B4-BE49-F238E27FC236}">
-                <a16:creationId xmlns:a16="http://schemas.microsoft.com/office/drawing/2014/main" id="{2480F6F5-6228-40F3-8E8F-458857746077}"/>
+                <a16:creationId xmlns:a16="http://schemas.microsoft.com/office/drawing/2014/main" id="{4C0BC8C6-9226-4A0F-B955-E3AF807B3FAE}"/>
               </a:ext>
             </a:extLst>
           </p:cNvPr>
@@ -15072,17 +15804,197 @@
         </p:nvSpPr>
         <p:spPr/>
         <p:txBody>
-          <a:bodyPr/>
+          <a:bodyPr>
+            <a:normAutofit fontScale="77500" lnSpcReduction="20000"/>
+          </a:bodyPr>
           <a:lstStyle/>
           <a:p>
-            <a:endParaRPr lang="en-US"/>
+            <a:r>
+              <a:rPr lang="en-US" dirty="0">
+                <a:highlight>
+                  <a:srgbClr val="FFFFFF"/>
+                </a:highlight>
+              </a:rPr>
+              <a:t>Exploratory Data Analysis.</a:t>
+            </a:r>
+          </a:p>
+          <a:p>
+            <a:pPr lvl="1"/>
+            <a:r>
+              <a:rPr lang="en-US" dirty="0">
+                <a:highlight>
+                  <a:srgbClr val="FFFFFF"/>
+                </a:highlight>
+              </a:rPr>
+              <a:t>Identified the skew in the data. </a:t>
+            </a:r>
+          </a:p>
+          <a:p>
+            <a:pPr lvl="1"/>
+            <a:r>
+              <a:rPr lang="en-US" dirty="0">
+                <a:highlight>
+                  <a:srgbClr val="FFFFFF"/>
+                </a:highlight>
+              </a:rPr>
+              <a:t>Performed association analysis on what types of cells are common</a:t>
+            </a:r>
+          </a:p>
+          <a:p>
+            <a:r>
+              <a:rPr lang="en-US" dirty="0">
+                <a:highlight>
+                  <a:srgbClr val="FFFFFF"/>
+                </a:highlight>
+              </a:rPr>
+              <a:t>Built individual cell images for training, testing and validation</a:t>
+            </a:r>
+          </a:p>
+          <a:p>
+            <a:pPr lvl="1"/>
+            <a:r>
+              <a:rPr lang="en-US" dirty="0">
+                <a:highlight>
+                  <a:srgbClr val="FFFFFF"/>
+                </a:highlight>
+              </a:rPr>
+              <a:t>Built about 151K images with single cells from 10k images in the competition data.</a:t>
+            </a:r>
+          </a:p>
+          <a:p>
+            <a:pPr lvl="1"/>
+            <a:r>
+              <a:rPr lang="en-US" dirty="0">
+                <a:highlight>
+                  <a:srgbClr val="FFFFFF"/>
+                </a:highlight>
+              </a:rPr>
+              <a:t>Scope the problem to 12 classes which has enough samples</a:t>
+            </a:r>
+          </a:p>
+          <a:p>
+            <a:pPr lvl="1"/>
+            <a:r>
+              <a:rPr lang="en-US" dirty="0">
+                <a:highlight>
+                  <a:srgbClr val="FFFFFF"/>
+                </a:highlight>
+              </a:rPr>
+              <a:t>Removed images under 4KB and &gt;1MB</a:t>
+            </a:r>
+          </a:p>
+          <a:p>
+            <a:pPr lvl="1"/>
+            <a:r>
+              <a:rPr lang="en-US" dirty="0">
+                <a:highlight>
+                  <a:srgbClr val="FFFFFF"/>
+                </a:highlight>
+              </a:rPr>
+              <a:t>Converted the images into 528 X 528 resolution</a:t>
+            </a:r>
+          </a:p>
+          <a:p>
+            <a:r>
+              <a:rPr lang="en-US" dirty="0">
+                <a:highlight>
+                  <a:srgbClr val="FFFFFF"/>
+                </a:highlight>
+              </a:rPr>
+              <a:t>Model building</a:t>
+            </a:r>
+          </a:p>
+          <a:p>
+            <a:pPr lvl="1"/>
+            <a:r>
+              <a:rPr lang="en-US" dirty="0">
+                <a:highlight>
+                  <a:srgbClr val="FFFFFF"/>
+                </a:highlight>
+              </a:rPr>
+              <a:t>Deep leaning techniques used with Transfer Learning approach</a:t>
+            </a:r>
+          </a:p>
+          <a:p>
+            <a:pPr lvl="1"/>
+            <a:r>
+              <a:rPr lang="en-US" dirty="0">
+                <a:highlight>
+                  <a:srgbClr val="FFFFFF"/>
+                </a:highlight>
+              </a:rPr>
+              <a:t>Used following approaches on images during model building</a:t>
+            </a:r>
+          </a:p>
+          <a:p>
+            <a:pPr lvl="2"/>
+            <a:r>
+              <a:rPr lang="en-US" dirty="0">
+                <a:highlight>
+                  <a:srgbClr val="FFFFFF"/>
+                </a:highlight>
+              </a:rPr>
+              <a:t>rotation, width shift, height shift, shearing, zoom and flipping</a:t>
+            </a:r>
+          </a:p>
+          <a:p>
+            <a:pPr lvl="1"/>
+            <a:r>
+              <a:rPr lang="en-US" dirty="0">
+                <a:highlight>
+                  <a:srgbClr val="FFFFFF"/>
+                </a:highlight>
+              </a:rPr>
+              <a:t>Used TensorFlow 2.0 with Nvidia GPU to build deep learning model</a:t>
+            </a:r>
+          </a:p>
+          <a:p>
+            <a:pPr lvl="2"/>
+            <a:r>
+              <a:rPr lang="en-US" dirty="0">
+                <a:highlight>
+                  <a:srgbClr val="FFFFFF"/>
+                </a:highlight>
+              </a:rPr>
+              <a:t>Used VGG16</a:t>
+            </a:r>
+            <a:r>
+              <a:rPr lang="en-US">
+                <a:highlight>
+                  <a:srgbClr val="FFFFFF"/>
+                </a:highlight>
+              </a:rPr>
+              <a:t>, resent101, </a:t>
+            </a:r>
+            <a:r>
+              <a:rPr lang="en-US"/>
+              <a:t>EfficientNetB6</a:t>
+            </a:r>
+            <a:endParaRPr lang="en-US" dirty="0">
+              <a:highlight>
+                <a:srgbClr val="FFFFFF"/>
+              </a:highlight>
+            </a:endParaRPr>
+          </a:p>
+          <a:p>
+            <a:r>
+              <a:rPr lang="en-US" dirty="0">
+                <a:highlight>
+                  <a:srgbClr val="FFFFFF"/>
+                </a:highlight>
+              </a:rPr>
+              <a:t>Final model took 2 days to build on Nvidia RTX 3090 GPU</a:t>
+            </a:r>
+          </a:p>
+          <a:p>
+            <a:endParaRPr lang="en-US" dirty="0"/>
           </a:p>
         </p:txBody>
       </p:sp>
     </p:spTree>
     <p:extLst>
       <p:ext uri="{BB962C8B-B14F-4D97-AF65-F5344CB8AC3E}">
-        <p14:creationId xmlns:p14="http://schemas.microsoft.com/office/powerpoint/2010/main" val="3119184983"/>
+        <p14:creationId xmlns:p14="http://schemas.microsoft.com/office/powerpoint/2010/main" val="760505189"/>
       </p:ext>
     </p:extLst>
   </p:cSld>
@@ -15097,7 +16009,7 @@
   <p:cSld>
     <p:spTree>
       <p:nvGrpSpPr>
-        <p:cNvPr id="1" name=""/>
+        <p:cNvPr id="1" name="Shape 225"/>
         <p:cNvGrpSpPr/>
         <p:nvPr/>
       </p:nvGrpSpPr>
@@ -15111,69 +16023,756 @@
       </p:grpSpPr>
       <p:sp>
         <p:nvSpPr>
-          <p:cNvPr id="2" name="Title 1">
-            <a:extLst>
-              <a:ext uri="{FF2B5EF4-FFF2-40B4-BE49-F238E27FC236}">
-                <a16:creationId xmlns:a16="http://schemas.microsoft.com/office/drawing/2014/main" id="{A5605D23-E4FD-4D7D-A927-2844A0CA0E55}"/>
-              </a:ext>
-            </a:extLst>
-          </p:cNvPr>
-          <p:cNvSpPr>
+          <p:cNvPr id="226" name="Google Shape;226;p10"/>
+          <p:cNvSpPr txBox="1">
             <a:spLocks noGrp="1"/>
           </p:cNvSpPr>
           <p:nvPr>
             <p:ph type="title"/>
           </p:nvPr>
         </p:nvSpPr>
-        <p:spPr/>
+        <p:spPr>
+          <a:xfrm>
+            <a:off x="838200" y="365126"/>
+            <a:ext cx="10515600" cy="615950"/>
+          </a:xfrm>
+          <a:prstGeom prst="rect">
+            <a:avLst/>
+          </a:prstGeom>
+          <a:noFill/>
+          <a:ln>
+            <a:noFill/>
+          </a:ln>
+        </p:spPr>
         <p:txBody>
-          <a:bodyPr>
-            <a:normAutofit/>
+          <a:bodyPr spcFirstLastPara="1" wrap="square" lIns="91425" tIns="45700" rIns="91425" bIns="45700" anchor="ctr" anchorCtr="0">
+            <a:noAutofit/>
           </a:bodyPr>
           <a:lstStyle/>
           <a:p>
-            <a:r>
-              <a:rPr lang="en-US" dirty="0">
-                <a:latin typeface="Calibri" panose="020F0502020204030204" pitchFamily="34" charset="0"/>
-                <a:cs typeface="Times New Roman" panose="02020603050405020304" pitchFamily="18" charset="0"/>
-              </a:rPr>
-              <a:t>Hands-on experience  on modern Databases</a:t>
-            </a:r>
-            <a:endParaRPr lang="en-US" dirty="0"/>
+            <a:pPr marL="0" lvl="0" indent="0" algn="ctr" rtl="0">
+              <a:lnSpc>
+                <a:spcPct val="90000"/>
+              </a:lnSpc>
+              <a:spcBef>
+                <a:spcPts val="0"/>
+              </a:spcBef>
+              <a:spcAft>
+                <a:spcPts val="0"/>
+              </a:spcAft>
+              <a:buClr>
+                <a:schemeClr val="dk1"/>
+              </a:buClr>
+              <a:buSzPts val="3200"/>
+              <a:buFont typeface="Calibri"/>
+              <a:buNone/>
+            </a:pPr>
+            <a:r>
+              <a:rPr lang="en-US" sz="3200" dirty="0"/>
+              <a:t>Confusion matrix(actual vs predicted %) – EfficientNetB6</a:t>
+            </a:r>
+            <a:endParaRPr sz="3200" dirty="0"/>
           </a:p>
         </p:txBody>
       </p:sp>
+      <p:pic>
+        <p:nvPicPr>
+          <p:cNvPr id="227" name="Google Shape;227;p10"/>
+          <p:cNvPicPr preferRelativeResize="0"/>
+          <p:nvPr/>
+        </p:nvPicPr>
+        <p:blipFill rotWithShape="1">
+          <a:blip r:embed="rId3">
+            <a:alphaModFix/>
+          </a:blip>
+          <a:srcRect/>
+          <a:stretch/>
+        </p:blipFill>
+        <p:spPr>
+          <a:xfrm>
+            <a:off x="5953125" y="1076382"/>
+            <a:ext cx="5953125" cy="5406967"/>
+          </a:xfrm>
+          <a:prstGeom prst="rect">
+            <a:avLst/>
+          </a:prstGeom>
+          <a:noFill/>
+          <a:ln>
+            <a:noFill/>
+          </a:ln>
+        </p:spPr>
+      </p:pic>
       <p:sp>
         <p:nvSpPr>
-          <p:cNvPr id="3" name="Content Placeholder 2">
-            <a:extLst>
-              <a:ext uri="{FF2B5EF4-FFF2-40B4-BE49-F238E27FC236}">
-                <a16:creationId xmlns:a16="http://schemas.microsoft.com/office/drawing/2014/main" id="{2480F6F5-6228-40F3-8E8F-458857746077}"/>
-              </a:ext>
-            </a:extLst>
-          </p:cNvPr>
-          <p:cNvSpPr>
-            <a:spLocks noGrp="1"/>
-          </p:cNvSpPr>
-          <p:nvPr>
-            <p:ph idx="1"/>
-          </p:nvPr>
+          <p:cNvPr id="228" name="Google Shape;228;p10"/>
+          <p:cNvSpPr txBox="1"/>
+          <p:nvPr/>
         </p:nvSpPr>
-        <p:spPr/>
+        <p:spPr>
+          <a:xfrm>
+            <a:off x="838200" y="1230094"/>
+            <a:ext cx="4755356" cy="3754874"/>
+          </a:xfrm>
+          <a:prstGeom prst="rect">
+            <a:avLst/>
+          </a:prstGeom>
+          <a:noFill/>
+          <a:ln>
+            <a:noFill/>
+          </a:ln>
+        </p:spPr>
         <p:txBody>
-          <a:bodyPr/>
+          <a:bodyPr spcFirstLastPara="1" wrap="square" lIns="91425" tIns="45700" rIns="91425" bIns="45700" anchor="t" anchorCtr="0">
+            <a:spAutoFit/>
+          </a:bodyPr>
           <a:lstStyle/>
           <a:p>
-            <a:endParaRPr lang="en-US" dirty="0"/>
+            <a:pPr marL="0" marR="0" lvl="0" indent="0" algn="l" rtl="0">
+              <a:lnSpc>
+                <a:spcPct val="100000"/>
+              </a:lnSpc>
+              <a:spcBef>
+                <a:spcPts val="0"/>
+              </a:spcBef>
+              <a:spcAft>
+                <a:spcPts val="0"/>
+              </a:spcAft>
+              <a:buClr>
+                <a:srgbClr val="000000"/>
+              </a:buClr>
+              <a:buSzPts val="1400"/>
+              <a:buFont typeface="Arial"/>
+              <a:buNone/>
+            </a:pPr>
+            <a:r>
+              <a:rPr lang="en-US" sz="1400" b="0" i="0" u="none" strike="noStrike" cap="none" dirty="0">
+                <a:solidFill>
+                  <a:srgbClr val="000000"/>
+                </a:solidFill>
+                <a:latin typeface="Arial"/>
+                <a:ea typeface="Arial"/>
+                <a:cs typeface="Arial"/>
+                <a:sym typeface="Arial"/>
+              </a:rPr>
+              <a:t>Validation samples: 28,445</a:t>
+            </a:r>
+            <a:endParaRPr sz="1400" b="0" i="0" u="none" strike="noStrike" cap="none" dirty="0">
+              <a:solidFill>
+                <a:srgbClr val="000000"/>
+              </a:solidFill>
+              <a:latin typeface="Arial"/>
+              <a:ea typeface="Arial"/>
+              <a:cs typeface="Arial"/>
+              <a:sym typeface="Arial"/>
+            </a:endParaRPr>
+          </a:p>
+          <a:p>
+            <a:pPr marL="0" marR="0" lvl="0" indent="0" algn="l" rtl="0">
+              <a:lnSpc>
+                <a:spcPct val="100000"/>
+              </a:lnSpc>
+              <a:spcBef>
+                <a:spcPts val="0"/>
+              </a:spcBef>
+              <a:spcAft>
+                <a:spcPts val="0"/>
+              </a:spcAft>
+              <a:buClr>
+                <a:srgbClr val="000000"/>
+              </a:buClr>
+              <a:buSzPts val="1400"/>
+              <a:buFont typeface="Arial"/>
+              <a:buNone/>
+            </a:pPr>
+            <a:r>
+              <a:rPr lang="en-US" sz="1400" b="0" i="0" u="none" strike="noStrike" cap="none" dirty="0">
+                <a:solidFill>
+                  <a:srgbClr val="000000"/>
+                </a:solidFill>
+                <a:latin typeface="Arial"/>
+                <a:ea typeface="Arial"/>
+                <a:cs typeface="Arial"/>
+                <a:sym typeface="Arial"/>
+              </a:rPr>
+              <a:t>Overall Validation Accuracy: 67.14%</a:t>
+            </a:r>
+            <a:endParaRPr sz="1400" b="0" i="0" u="none" strike="noStrike" cap="none" dirty="0">
+              <a:solidFill>
+                <a:srgbClr val="000000"/>
+              </a:solidFill>
+              <a:latin typeface="Arial"/>
+              <a:ea typeface="Arial"/>
+              <a:cs typeface="Arial"/>
+              <a:sym typeface="Arial"/>
+            </a:endParaRPr>
+          </a:p>
+          <a:p>
+            <a:pPr marL="0" marR="0" lvl="0" indent="0" algn="l" rtl="0">
+              <a:lnSpc>
+                <a:spcPct val="100000"/>
+              </a:lnSpc>
+              <a:spcBef>
+                <a:spcPts val="0"/>
+              </a:spcBef>
+              <a:spcAft>
+                <a:spcPts val="0"/>
+              </a:spcAft>
+              <a:buClr>
+                <a:srgbClr val="000000"/>
+              </a:buClr>
+              <a:buSzPts val="1400"/>
+              <a:buFont typeface="Arial"/>
+              <a:buNone/>
+            </a:pPr>
+            <a:endParaRPr sz="1400" b="0" i="0" u="none" strike="noStrike" cap="none" dirty="0">
+              <a:solidFill>
+                <a:srgbClr val="000000"/>
+              </a:solidFill>
+              <a:latin typeface="Arial"/>
+              <a:ea typeface="Arial"/>
+              <a:cs typeface="Arial"/>
+              <a:sym typeface="Arial"/>
+            </a:endParaRPr>
+          </a:p>
+          <a:p>
+            <a:pPr marL="0" marR="0" lvl="0" indent="0" algn="l" rtl="0">
+              <a:lnSpc>
+                <a:spcPct val="100000"/>
+              </a:lnSpc>
+              <a:spcBef>
+                <a:spcPts val="0"/>
+              </a:spcBef>
+              <a:spcAft>
+                <a:spcPts val="0"/>
+              </a:spcAft>
+              <a:buClr>
+                <a:srgbClr val="000000"/>
+              </a:buClr>
+              <a:buSzPts val="1400"/>
+              <a:buFont typeface="Arial"/>
+              <a:buNone/>
+            </a:pPr>
+            <a:r>
+              <a:rPr lang="en-US" sz="1400" b="0" i="0" u="none" strike="noStrike" cap="none" dirty="0">
+                <a:solidFill>
+                  <a:srgbClr val="000000"/>
+                </a:solidFill>
+                <a:latin typeface="Arial"/>
+                <a:ea typeface="Arial"/>
+                <a:cs typeface="Arial"/>
+                <a:sym typeface="Arial"/>
+              </a:rPr>
+              <a:t>Test samples :  9,482</a:t>
+            </a:r>
+            <a:endParaRPr sz="1400" b="0" i="0" u="none" strike="noStrike" cap="none" dirty="0">
+              <a:solidFill>
+                <a:srgbClr val="000000"/>
+              </a:solidFill>
+              <a:latin typeface="Arial"/>
+              <a:ea typeface="Arial"/>
+              <a:cs typeface="Arial"/>
+              <a:sym typeface="Arial"/>
+            </a:endParaRPr>
+          </a:p>
+          <a:p>
+            <a:pPr marL="0" marR="0" lvl="0" indent="0" algn="l" rtl="0">
+              <a:lnSpc>
+                <a:spcPct val="100000"/>
+              </a:lnSpc>
+              <a:spcBef>
+                <a:spcPts val="0"/>
+              </a:spcBef>
+              <a:spcAft>
+                <a:spcPts val="0"/>
+              </a:spcAft>
+              <a:buClr>
+                <a:srgbClr val="000000"/>
+              </a:buClr>
+              <a:buSzPts val="1400"/>
+              <a:buFont typeface="Arial"/>
+              <a:buNone/>
+            </a:pPr>
+            <a:endParaRPr sz="1400" b="0" i="0" u="none" strike="noStrike" cap="none" dirty="0">
+              <a:solidFill>
+                <a:srgbClr val="000000"/>
+              </a:solidFill>
+              <a:latin typeface="Arial"/>
+              <a:ea typeface="Arial"/>
+              <a:cs typeface="Arial"/>
+              <a:sym typeface="Arial"/>
+            </a:endParaRPr>
+          </a:p>
+          <a:p>
+            <a:pPr marL="0" marR="0" lvl="0" indent="0" algn="l" rtl="0">
+              <a:lnSpc>
+                <a:spcPct val="100000"/>
+              </a:lnSpc>
+              <a:spcBef>
+                <a:spcPts val="0"/>
+              </a:spcBef>
+              <a:spcAft>
+                <a:spcPts val="0"/>
+              </a:spcAft>
+              <a:buClr>
+                <a:srgbClr val="000000"/>
+              </a:buClr>
+              <a:buSzPts val="1400"/>
+              <a:buFont typeface="Arial"/>
+              <a:buNone/>
+            </a:pPr>
+            <a:r>
+              <a:rPr lang="en-US" sz="1400" b="0" i="0" u="none" strike="noStrike" cap="none" dirty="0">
+                <a:solidFill>
+                  <a:srgbClr val="000000"/>
+                </a:solidFill>
+                <a:highlight>
+                  <a:srgbClr val="00FF00"/>
+                </a:highlight>
+                <a:latin typeface="Arial"/>
+                <a:ea typeface="Arial"/>
+                <a:cs typeface="Arial"/>
+                <a:sym typeface="Arial"/>
+              </a:rPr>
+              <a:t>Highest Accuracy:</a:t>
+            </a:r>
+            <a:endParaRPr sz="1400" b="0" i="0" u="none" strike="noStrike" cap="none" dirty="0">
+              <a:solidFill>
+                <a:srgbClr val="000000"/>
+              </a:solidFill>
+              <a:latin typeface="Arial"/>
+              <a:ea typeface="Arial"/>
+              <a:cs typeface="Arial"/>
+              <a:sym typeface="Arial"/>
+            </a:endParaRPr>
+          </a:p>
+          <a:p>
+            <a:pPr marL="285750" marR="0" lvl="0" indent="-285750" algn="l" rtl="0">
+              <a:lnSpc>
+                <a:spcPct val="100000"/>
+              </a:lnSpc>
+              <a:spcBef>
+                <a:spcPts val="0"/>
+              </a:spcBef>
+              <a:spcAft>
+                <a:spcPts val="0"/>
+              </a:spcAft>
+              <a:buClr>
+                <a:srgbClr val="000000"/>
+              </a:buClr>
+              <a:buSzPts val="1400"/>
+              <a:buFont typeface="Arial"/>
+              <a:buChar char="•"/>
+            </a:pPr>
+            <a:r>
+              <a:rPr lang="en-US" sz="1400" b="0" i="0" u="none" strike="noStrike" cap="none" dirty="0">
+                <a:solidFill>
+                  <a:srgbClr val="000000"/>
+                </a:solidFill>
+                <a:latin typeface="Arial"/>
+                <a:ea typeface="Arial"/>
+                <a:cs typeface="Arial"/>
+                <a:sym typeface="Arial"/>
+              </a:rPr>
+              <a:t>Nucleoplasm (82%)</a:t>
+            </a:r>
+            <a:endParaRPr sz="1400" b="0" i="0" u="none" strike="noStrike" cap="none" dirty="0">
+              <a:solidFill>
+                <a:srgbClr val="000000"/>
+              </a:solidFill>
+              <a:latin typeface="Arial"/>
+              <a:ea typeface="Arial"/>
+              <a:cs typeface="Arial"/>
+              <a:sym typeface="Arial"/>
+            </a:endParaRPr>
+          </a:p>
+          <a:p>
+            <a:pPr marL="285750" marR="0" lvl="0" indent="-285750" algn="l" rtl="0">
+              <a:lnSpc>
+                <a:spcPct val="100000"/>
+              </a:lnSpc>
+              <a:spcBef>
+                <a:spcPts val="0"/>
+              </a:spcBef>
+              <a:spcAft>
+                <a:spcPts val="0"/>
+              </a:spcAft>
+              <a:buClr>
+                <a:srgbClr val="000000"/>
+              </a:buClr>
+              <a:buSzPts val="1400"/>
+              <a:buFont typeface="Arial"/>
+              <a:buChar char="•"/>
+            </a:pPr>
+            <a:r>
+              <a:rPr lang="en-US" sz="1400" b="0" i="0" u="none" strike="noStrike" cap="none" dirty="0">
+                <a:solidFill>
+                  <a:srgbClr val="000000"/>
+                </a:solidFill>
+                <a:latin typeface="Arial"/>
+                <a:ea typeface="Arial"/>
+                <a:cs typeface="Arial"/>
+                <a:sym typeface="Arial"/>
+              </a:rPr>
+              <a:t>Nuclear speckles (79%)</a:t>
+            </a:r>
+            <a:endParaRPr sz="1400" b="0" i="0" u="none" strike="noStrike" cap="none" dirty="0">
+              <a:solidFill>
+                <a:srgbClr val="000000"/>
+              </a:solidFill>
+              <a:latin typeface="Arial"/>
+              <a:ea typeface="Arial"/>
+              <a:cs typeface="Arial"/>
+              <a:sym typeface="Arial"/>
+            </a:endParaRPr>
+          </a:p>
+          <a:p>
+            <a:pPr marL="285750" marR="0" lvl="0" indent="-285750" algn="l" rtl="0">
+              <a:lnSpc>
+                <a:spcPct val="100000"/>
+              </a:lnSpc>
+              <a:spcBef>
+                <a:spcPts val="0"/>
+              </a:spcBef>
+              <a:spcAft>
+                <a:spcPts val="0"/>
+              </a:spcAft>
+              <a:buClr>
+                <a:srgbClr val="000000"/>
+              </a:buClr>
+              <a:buSzPts val="1400"/>
+              <a:buFont typeface="Arial"/>
+              <a:buChar char="•"/>
+            </a:pPr>
+            <a:r>
+              <a:rPr lang="en-US" sz="1400" b="0" i="0" u="none" strike="noStrike" cap="none" dirty="0">
+                <a:solidFill>
+                  <a:srgbClr val="000000"/>
+                </a:solidFill>
+                <a:latin typeface="Arial"/>
+                <a:ea typeface="Arial"/>
+                <a:cs typeface="Arial"/>
+                <a:sym typeface="Arial"/>
+              </a:rPr>
+              <a:t>Mitochondria ( 74%)</a:t>
+            </a:r>
+            <a:endParaRPr sz="1400" b="0" i="0" u="none" strike="noStrike" cap="none" dirty="0">
+              <a:solidFill>
+                <a:srgbClr val="000000"/>
+              </a:solidFill>
+              <a:latin typeface="Arial"/>
+              <a:ea typeface="Arial"/>
+              <a:cs typeface="Arial"/>
+              <a:sym typeface="Arial"/>
+            </a:endParaRPr>
+          </a:p>
+          <a:p>
+            <a:pPr marL="285750" marR="0" lvl="0" indent="-196850" algn="l" rtl="0">
+              <a:lnSpc>
+                <a:spcPct val="100000"/>
+              </a:lnSpc>
+              <a:spcBef>
+                <a:spcPts val="0"/>
+              </a:spcBef>
+              <a:spcAft>
+                <a:spcPts val="0"/>
+              </a:spcAft>
+              <a:buClr>
+                <a:srgbClr val="000000"/>
+              </a:buClr>
+              <a:buSzPts val="1400"/>
+              <a:buFont typeface="Arial"/>
+              <a:buNone/>
+            </a:pPr>
+            <a:endParaRPr sz="1400" b="0" i="0" u="none" strike="noStrike" cap="none" dirty="0">
+              <a:solidFill>
+                <a:srgbClr val="000000"/>
+              </a:solidFill>
+              <a:latin typeface="Arial"/>
+              <a:ea typeface="Arial"/>
+              <a:cs typeface="Arial"/>
+              <a:sym typeface="Arial"/>
+            </a:endParaRPr>
+          </a:p>
+          <a:p>
+            <a:pPr marL="0" marR="0" lvl="0" indent="0" algn="l" rtl="0">
+              <a:lnSpc>
+                <a:spcPct val="100000"/>
+              </a:lnSpc>
+              <a:spcBef>
+                <a:spcPts val="0"/>
+              </a:spcBef>
+              <a:spcAft>
+                <a:spcPts val="0"/>
+              </a:spcAft>
+              <a:buClr>
+                <a:srgbClr val="000000"/>
+              </a:buClr>
+              <a:buSzPts val="1400"/>
+              <a:buFont typeface="Arial"/>
+              <a:buNone/>
+            </a:pPr>
+            <a:r>
+              <a:rPr lang="en-US" sz="1400" b="0" i="0" u="none" strike="noStrike" cap="none" dirty="0">
+                <a:solidFill>
+                  <a:srgbClr val="000000"/>
+                </a:solidFill>
+                <a:highlight>
+                  <a:srgbClr val="FF0000"/>
+                </a:highlight>
+                <a:latin typeface="Arial"/>
+                <a:ea typeface="Arial"/>
+                <a:cs typeface="Arial"/>
+                <a:sym typeface="Arial"/>
+              </a:rPr>
+              <a:t>Lowest Accuracy:</a:t>
+            </a:r>
+            <a:endParaRPr sz="1400" b="0" i="0" u="none" strike="noStrike" cap="none" dirty="0">
+              <a:solidFill>
+                <a:srgbClr val="000000"/>
+              </a:solidFill>
+              <a:latin typeface="Arial"/>
+              <a:ea typeface="Arial"/>
+              <a:cs typeface="Arial"/>
+              <a:sym typeface="Arial"/>
+            </a:endParaRPr>
+          </a:p>
+          <a:p>
+            <a:pPr marL="285750" marR="0" lvl="0" indent="-285750" algn="l" rtl="0">
+              <a:lnSpc>
+                <a:spcPct val="100000"/>
+              </a:lnSpc>
+              <a:spcBef>
+                <a:spcPts val="0"/>
+              </a:spcBef>
+              <a:spcAft>
+                <a:spcPts val="0"/>
+              </a:spcAft>
+              <a:buClr>
+                <a:srgbClr val="000000"/>
+              </a:buClr>
+              <a:buSzPts val="1400"/>
+              <a:buFont typeface="Arial"/>
+              <a:buChar char="•"/>
+            </a:pPr>
+            <a:r>
+              <a:rPr lang="en-US" sz="1400" b="0" i="0" u="none" strike="noStrike" cap="none" dirty="0">
+                <a:solidFill>
+                  <a:srgbClr val="000000"/>
+                </a:solidFill>
+                <a:latin typeface="Arial"/>
+                <a:ea typeface="Arial"/>
+                <a:cs typeface="Arial"/>
+                <a:sym typeface="Arial"/>
+              </a:rPr>
+              <a:t>Endoplasmic reticulum – 52%</a:t>
+            </a:r>
+            <a:endParaRPr sz="1400" b="0" i="0" u="none" strike="noStrike" cap="none" dirty="0">
+              <a:solidFill>
+                <a:srgbClr val="000000"/>
+              </a:solidFill>
+              <a:latin typeface="Arial"/>
+              <a:ea typeface="Arial"/>
+              <a:cs typeface="Arial"/>
+              <a:sym typeface="Arial"/>
+            </a:endParaRPr>
+          </a:p>
+          <a:p>
+            <a:pPr marL="0" marR="0" lvl="0" indent="0" algn="l" rtl="0">
+              <a:lnSpc>
+                <a:spcPct val="100000"/>
+              </a:lnSpc>
+              <a:spcBef>
+                <a:spcPts val="0"/>
+              </a:spcBef>
+              <a:spcAft>
+                <a:spcPts val="0"/>
+              </a:spcAft>
+              <a:buClr>
+                <a:srgbClr val="000000"/>
+              </a:buClr>
+              <a:buSzPts val="1400"/>
+              <a:buFont typeface="Arial"/>
+              <a:buNone/>
+            </a:pPr>
+            <a:endParaRPr sz="1400" b="0" i="0" u="none" strike="noStrike" cap="none" dirty="0">
+              <a:solidFill>
+                <a:srgbClr val="000000"/>
+              </a:solidFill>
+              <a:highlight>
+                <a:srgbClr val="FFFF00"/>
+              </a:highlight>
+              <a:latin typeface="Arial"/>
+              <a:ea typeface="Arial"/>
+              <a:cs typeface="Arial"/>
+              <a:sym typeface="Arial"/>
+            </a:endParaRPr>
+          </a:p>
+          <a:p>
+            <a:pPr marL="0" marR="0" lvl="0" indent="0" algn="l" rtl="0">
+              <a:lnSpc>
+                <a:spcPct val="100000"/>
+              </a:lnSpc>
+              <a:spcBef>
+                <a:spcPts val="0"/>
+              </a:spcBef>
+              <a:spcAft>
+                <a:spcPts val="0"/>
+              </a:spcAft>
+              <a:buClr>
+                <a:srgbClr val="000000"/>
+              </a:buClr>
+              <a:buSzPts val="1400"/>
+              <a:buFont typeface="Arial"/>
+              <a:buNone/>
+            </a:pPr>
+            <a:r>
+              <a:rPr lang="en-US" sz="1400" b="0" i="0" u="none" strike="noStrike" cap="none" dirty="0">
+                <a:solidFill>
+                  <a:srgbClr val="000000"/>
+                </a:solidFill>
+                <a:highlight>
+                  <a:srgbClr val="FFFF00"/>
+                </a:highlight>
+                <a:latin typeface="Arial"/>
+                <a:ea typeface="Arial"/>
+                <a:cs typeface="Arial"/>
+                <a:sym typeface="Arial"/>
+              </a:rPr>
+              <a:t>Top mis classification:</a:t>
+            </a:r>
+            <a:endParaRPr sz="1400" b="0" i="0" u="none" strike="noStrike" cap="none" dirty="0">
+              <a:solidFill>
+                <a:srgbClr val="000000"/>
+              </a:solidFill>
+              <a:latin typeface="Arial"/>
+              <a:ea typeface="Arial"/>
+              <a:cs typeface="Arial"/>
+              <a:sym typeface="Arial"/>
+            </a:endParaRPr>
+          </a:p>
+          <a:p>
+            <a:pPr marL="285750" marR="0" lvl="0" indent="-285750" algn="l" rtl="0">
+              <a:lnSpc>
+                <a:spcPct val="100000"/>
+              </a:lnSpc>
+              <a:spcBef>
+                <a:spcPts val="0"/>
+              </a:spcBef>
+              <a:spcAft>
+                <a:spcPts val="0"/>
+              </a:spcAft>
+              <a:buClr>
+                <a:srgbClr val="000000"/>
+              </a:buClr>
+              <a:buSzPts val="1400"/>
+              <a:buFont typeface="Arial"/>
+              <a:buChar char="•"/>
+            </a:pPr>
+            <a:r>
+              <a:rPr lang="en-US" sz="1400" b="0" i="0" u="none" strike="noStrike" cap="none" dirty="0">
+                <a:solidFill>
+                  <a:srgbClr val="000000"/>
+                </a:solidFill>
+                <a:latin typeface="Arial"/>
+                <a:ea typeface="Arial"/>
+                <a:cs typeface="Arial"/>
+                <a:sym typeface="Arial"/>
+              </a:rPr>
+              <a:t>Nuclear bodies</a:t>
+            </a:r>
+            <a:endParaRPr sz="1400" b="0" i="0" u="none" strike="noStrike" cap="none" dirty="0">
+              <a:solidFill>
+                <a:srgbClr val="000000"/>
+              </a:solidFill>
+              <a:latin typeface="Arial"/>
+              <a:ea typeface="Arial"/>
+              <a:cs typeface="Arial"/>
+              <a:sym typeface="Arial"/>
+            </a:endParaRPr>
+          </a:p>
+          <a:p>
+            <a:pPr marL="285750" marR="0" lvl="0" indent="-285750" algn="l" rtl="0">
+              <a:lnSpc>
+                <a:spcPct val="100000"/>
+              </a:lnSpc>
+              <a:spcBef>
+                <a:spcPts val="0"/>
+              </a:spcBef>
+              <a:spcAft>
+                <a:spcPts val="0"/>
+              </a:spcAft>
+              <a:buClr>
+                <a:srgbClr val="000000"/>
+              </a:buClr>
+              <a:buSzPts val="1400"/>
+              <a:buFont typeface="Arial"/>
+              <a:buChar char="•"/>
+            </a:pPr>
+            <a:r>
+              <a:rPr lang="en-US" sz="1400" b="0" i="0" u="none" strike="noStrike" cap="none" dirty="0">
+                <a:solidFill>
+                  <a:srgbClr val="000000"/>
+                </a:solidFill>
+                <a:latin typeface="Arial"/>
+                <a:ea typeface="Arial"/>
+                <a:cs typeface="Arial"/>
+                <a:sym typeface="Arial"/>
+              </a:rPr>
+              <a:t>Nucleoplasm</a:t>
+            </a:r>
+            <a:endParaRPr sz="1400" b="0" i="0" u="none" strike="noStrike" cap="none" dirty="0">
+              <a:solidFill>
+                <a:srgbClr val="000000"/>
+              </a:solidFill>
+              <a:latin typeface="Arial"/>
+              <a:ea typeface="Arial"/>
+              <a:cs typeface="Arial"/>
+              <a:sym typeface="Arial"/>
+            </a:endParaRPr>
+          </a:p>
+          <a:p>
+            <a:pPr marL="285750" marR="0" lvl="0" indent="-285750" algn="l" rtl="0">
+              <a:lnSpc>
+                <a:spcPct val="100000"/>
+              </a:lnSpc>
+              <a:spcBef>
+                <a:spcPts val="0"/>
+              </a:spcBef>
+              <a:spcAft>
+                <a:spcPts val="0"/>
+              </a:spcAft>
+              <a:buClr>
+                <a:srgbClr val="000000"/>
+              </a:buClr>
+              <a:buSzPts val="1400"/>
+              <a:buFont typeface="Arial"/>
+              <a:buChar char="•"/>
+            </a:pPr>
+            <a:r>
+              <a:rPr lang="en-US" sz="1400" b="0" i="0" u="none" strike="noStrike" cap="none" dirty="0">
+                <a:solidFill>
+                  <a:srgbClr val="000000"/>
+                </a:solidFill>
+                <a:latin typeface="Arial"/>
+                <a:ea typeface="Arial"/>
+                <a:cs typeface="Arial"/>
+                <a:sym typeface="Arial"/>
+              </a:rPr>
+              <a:t>Cytosol</a:t>
+            </a:r>
+            <a:endParaRPr sz="1400" b="0" i="0" u="none" strike="noStrike" cap="none" dirty="0">
+              <a:solidFill>
+                <a:srgbClr val="000000"/>
+              </a:solidFill>
+              <a:latin typeface="Arial"/>
+              <a:ea typeface="Arial"/>
+              <a:cs typeface="Arial"/>
+              <a:sym typeface="Arial"/>
+            </a:endParaRPr>
           </a:p>
         </p:txBody>
       </p:sp>
     </p:spTree>
-    <p:extLst>
-      <p:ext uri="{BB962C8B-B14F-4D97-AF65-F5344CB8AC3E}">
-        <p14:creationId xmlns:p14="http://schemas.microsoft.com/office/powerpoint/2010/main" val="2782192091"/>
-      </p:ext>
-    </p:extLst>
   </p:cSld>
   <p:clrMapOvr>
     <a:masterClrMapping/>
@@ -15772,6 +17371,21 @@
 </file>
 
 <file path=customXml/item1.xml><?xml version="1.0" encoding="utf-8"?>
+<p:properties xmlns:p="http://schemas.microsoft.com/office/2006/metadata/properties" xmlns:xsi="http://www.w3.org/2001/XMLSchema-instance" xmlns:pc="http://schemas.microsoft.com/office/infopath/2007/PartnerControls">
+  <documentManagement/>
+</p:properties>
+</file>
+
+<file path=customXml/item2.xml><?xml version="1.0" encoding="utf-8"?>
+<?mso-contentType ?>
+<FormTemplates xmlns="http://schemas.microsoft.com/sharepoint/v3/contenttype/forms">
+  <Display>DocumentLibraryForm</Display>
+  <Edit>DocumentLibraryForm</Edit>
+  <New>DocumentLibraryForm</New>
+</FormTemplates>
+</file>
+
+<file path=customXml/item3.xml><?xml version="1.0" encoding="utf-8"?>
 <ct:contentTypeSchema xmlns:ct="http://schemas.microsoft.com/office/2006/metadata/contentType" xmlns:ma="http://schemas.microsoft.com/office/2006/metadata/properties/metaAttributes" ct:_="" ma:_="" ma:contentTypeName="Document" ma:contentTypeID="0x0101006E7876CE5A991D42848489547AF4CBAE" ma:contentTypeVersion="7" ma:contentTypeDescription="Create a new document." ma:contentTypeScope="" ma:versionID="89cc19e11a35f1f1733091247c63d3c9">
   <xsd:schema xmlns:xsd="http://www.w3.org/2001/XMLSchema" xmlns:xs="http://www.w3.org/2001/XMLSchema" xmlns:p="http://schemas.microsoft.com/office/2006/metadata/properties" xmlns:ns3="7a2312a6-a8c3-41ac-9a29-150ba0710c9a" xmlns:ns4="45cf2939-8fa7-49e3-ad34-0c168c521b81" targetNamespace="http://schemas.microsoft.com/office/2006/metadata/properties" ma:root="true" ma:fieldsID="e83f5769af76e5bf1778458621af7ef9" ns3:_="" ns4:_="">
     <xsd:import namespace="7a2312a6-a8c3-41ac-9a29-150ba0710c9a"/>
@@ -15956,22 +17570,32 @@
 </ct:contentTypeSchema>
 </file>
 
-<file path=customXml/item2.xml><?xml version="1.0" encoding="utf-8"?>
-<?mso-contentType ?>
-<FormTemplates xmlns="http://schemas.microsoft.com/sharepoint/v3/contenttype/forms">
-  <Display>DocumentLibraryForm</Display>
-  <Edit>DocumentLibraryForm</Edit>
-  <New>DocumentLibraryForm</New>
-</FormTemplates>
+<file path=customXml/itemProps1.xml><?xml version="1.0" encoding="utf-8"?>
+<ds:datastoreItem xmlns:ds="http://schemas.openxmlformats.org/officeDocument/2006/customXml" ds:itemID="{B6CAC4AE-67DD-479D-A1E3-723FE1202C57}">
+  <ds:schemaRefs>
+    <ds:schemaRef ds:uri="http://www.w3.org/XML/1998/namespace"/>
+    <ds:schemaRef ds:uri="7a2312a6-a8c3-41ac-9a29-150ba0710c9a"/>
+    <ds:schemaRef ds:uri="http://schemas.microsoft.com/office/2006/documentManagement/types"/>
+    <ds:schemaRef ds:uri="http://purl.org/dc/terms/"/>
+    <ds:schemaRef ds:uri="http://schemas.microsoft.com/office/infopath/2007/PartnerControls"/>
+    <ds:schemaRef ds:uri="http://schemas.openxmlformats.org/package/2006/metadata/core-properties"/>
+    <ds:schemaRef ds:uri="http://purl.org/dc/elements/1.1/"/>
+    <ds:schemaRef ds:uri="45cf2939-8fa7-49e3-ad34-0c168c521b81"/>
+    <ds:schemaRef ds:uri="http://schemas.microsoft.com/office/2006/metadata/properties"/>
+    <ds:schemaRef ds:uri="http://purl.org/dc/dcmitype/"/>
+  </ds:schemaRefs>
+</ds:datastoreItem>
 </file>
 
-<file path=customXml/item3.xml><?xml version="1.0" encoding="utf-8"?>
-<p:properties xmlns:p="http://schemas.microsoft.com/office/2006/metadata/properties" xmlns:xsi="http://www.w3.org/2001/XMLSchema-instance" xmlns:pc="http://schemas.microsoft.com/office/infopath/2007/PartnerControls">
-  <documentManagement/>
-</p:properties>
+<file path=customXml/itemProps2.xml><?xml version="1.0" encoding="utf-8"?>
+<ds:datastoreItem xmlns:ds="http://schemas.openxmlformats.org/officeDocument/2006/customXml" ds:itemID="{42CA6DBA-0F9E-49D4-986C-16023887AF58}">
+  <ds:schemaRefs>
+    <ds:schemaRef ds:uri="http://schemas.microsoft.com/sharepoint/v3/contenttype/forms"/>
+  </ds:schemaRefs>
+</ds:datastoreItem>
 </file>
 
-<file path=customXml/itemProps1.xml><?xml version="1.0" encoding="utf-8"?>
+<file path=customXml/itemProps3.xml><?xml version="1.0" encoding="utf-8"?>
 <ds:datastoreItem xmlns:ds="http://schemas.openxmlformats.org/officeDocument/2006/customXml" ds:itemID="{C2021213-501F-43B0-98F1-FE78227F530C}">
   <ds:schemaRefs>
     <ds:schemaRef ds:uri="http://schemas.microsoft.com/office/2006/metadata/contentType"/>
@@ -15988,29 +17612,4 @@
     <ds:schemaRef ds:uri="http://schemas.microsoft.com/internal/obd"/>
   </ds:schemaRefs>
 </ds:datastoreItem>
-</file>
-
-<file path=customXml/itemProps2.xml><?xml version="1.0" encoding="utf-8"?>
-<ds:datastoreItem xmlns:ds="http://schemas.openxmlformats.org/officeDocument/2006/customXml" ds:itemID="{42CA6DBA-0F9E-49D4-986C-16023887AF58}">
-  <ds:schemaRefs>
-    <ds:schemaRef ds:uri="http://schemas.microsoft.com/sharepoint/v3/contenttype/forms"/>
-  </ds:schemaRefs>
-</ds:datastoreItem>
-</file>
-
-<file path=customXml/itemProps3.xml><?xml version="1.0" encoding="utf-8"?>
-<ds:datastoreItem xmlns:ds="http://schemas.openxmlformats.org/officeDocument/2006/customXml" ds:itemID="{B6CAC4AE-67DD-479D-A1E3-723FE1202C57}">
-  <ds:schemaRefs>
-    <ds:schemaRef ds:uri="http://www.w3.org/XML/1998/namespace"/>
-    <ds:schemaRef ds:uri="7a2312a6-a8c3-41ac-9a29-150ba0710c9a"/>
-    <ds:schemaRef ds:uri="http://schemas.microsoft.com/office/2006/documentManagement/types"/>
-    <ds:schemaRef ds:uri="http://purl.org/dc/terms/"/>
-    <ds:schemaRef ds:uri="http://schemas.microsoft.com/office/infopath/2007/PartnerControls"/>
-    <ds:schemaRef ds:uri="http://schemas.openxmlformats.org/package/2006/metadata/core-properties"/>
-    <ds:schemaRef ds:uri="http://purl.org/dc/elements/1.1/"/>
-    <ds:schemaRef ds:uri="45cf2939-8fa7-49e3-ad34-0c168c521b81"/>
-    <ds:schemaRef ds:uri="http://schemas.microsoft.com/office/2006/metadata/properties"/>
-    <ds:schemaRef ds:uri="http://purl.org/dc/dcmitype/"/>
-  </ds:schemaRefs>
-</ds:datastoreItem>
 </file>
</xml_diff>

<commit_message>
updated the presentation with visualization project
</commit_message>
<xml_diff>
--- a/MS ADS.pptx
+++ b/MS ADS.pptx
@@ -5,7 +5,7 @@
     <p:sldMasterId id="2147483648" r:id="rId4"/>
   </p:sldMasterIdLst>
   <p:notesMasterIdLst>
-    <p:notesMasterId r:id="rId22"/>
+    <p:notesMasterId r:id="rId23"/>
   </p:notesMasterIdLst>
   <p:sldIdLst>
     <p:sldId id="256" r:id="rId5"/>
@@ -20,11 +20,12 @@
     <p:sldId id="277" r:id="rId14"/>
     <p:sldId id="278" r:id="rId15"/>
     <p:sldId id="262" r:id="rId16"/>
-    <p:sldId id="263" r:id="rId17"/>
-    <p:sldId id="265" r:id="rId18"/>
-    <p:sldId id="257" r:id="rId19"/>
-    <p:sldId id="264" r:id="rId20"/>
-    <p:sldId id="276" r:id="rId21"/>
+    <p:sldId id="280" r:id="rId17"/>
+    <p:sldId id="263" r:id="rId18"/>
+    <p:sldId id="265" r:id="rId19"/>
+    <p:sldId id="257" r:id="rId20"/>
+    <p:sldId id="264" r:id="rId21"/>
+    <p:sldId id="276" r:id="rId22"/>
   </p:sldIdLst>
   <p:sldSz cx="12192000" cy="6858000"/>
   <p:notesSz cx="6858000" cy="9144000"/>
@@ -7032,7 +7033,7 @@
           <a:p>
             <a:fld id="{C4EDFC01-9F45-445E-A8F1-81A112EE4F26}" type="datetimeFigureOut">
               <a:rPr lang="en-US" smtClean="0"/>
-              <a:t>3/9/2022</a:t>
+              <a:t>3/10/2022</a:t>
             </a:fld>
             <a:endParaRPr lang="en-US"/>
           </a:p>
@@ -7655,7 +7656,7 @@
           <a:p>
             <a:fld id="{43C97625-BF87-4FD9-B6A3-7784DB263167}" type="datetimeFigureOut">
               <a:rPr lang="en-US" smtClean="0"/>
-              <a:t>3/9/2022</a:t>
+              <a:t>3/10/2022</a:t>
             </a:fld>
             <a:endParaRPr lang="en-US"/>
           </a:p>
@@ -7853,7 +7854,7 @@
           <a:p>
             <a:fld id="{43C97625-BF87-4FD9-B6A3-7784DB263167}" type="datetimeFigureOut">
               <a:rPr lang="en-US" smtClean="0"/>
-              <a:t>3/9/2022</a:t>
+              <a:t>3/10/2022</a:t>
             </a:fld>
             <a:endParaRPr lang="en-US"/>
           </a:p>
@@ -8061,7 +8062,7 @@
           <a:p>
             <a:fld id="{43C97625-BF87-4FD9-B6A3-7784DB263167}" type="datetimeFigureOut">
               <a:rPr lang="en-US" smtClean="0"/>
-              <a:t>3/9/2022</a:t>
+              <a:t>3/10/2022</a:t>
             </a:fld>
             <a:endParaRPr lang="en-US"/>
           </a:p>
@@ -8259,7 +8260,7 @@
           <a:p>
             <a:fld id="{43C97625-BF87-4FD9-B6A3-7784DB263167}" type="datetimeFigureOut">
               <a:rPr lang="en-US" smtClean="0"/>
-              <a:t>3/9/2022</a:t>
+              <a:t>3/10/2022</a:t>
             </a:fld>
             <a:endParaRPr lang="en-US"/>
           </a:p>
@@ -8534,7 +8535,7 @@
           <a:p>
             <a:fld id="{43C97625-BF87-4FD9-B6A3-7784DB263167}" type="datetimeFigureOut">
               <a:rPr lang="en-US" smtClean="0"/>
-              <a:t>3/9/2022</a:t>
+              <a:t>3/10/2022</a:t>
             </a:fld>
             <a:endParaRPr lang="en-US"/>
           </a:p>
@@ -8799,7 +8800,7 @@
           <a:p>
             <a:fld id="{43C97625-BF87-4FD9-B6A3-7784DB263167}" type="datetimeFigureOut">
               <a:rPr lang="en-US" smtClean="0"/>
-              <a:t>3/9/2022</a:t>
+              <a:t>3/10/2022</a:t>
             </a:fld>
             <a:endParaRPr lang="en-US"/>
           </a:p>
@@ -9211,7 +9212,7 @@
           <a:p>
             <a:fld id="{43C97625-BF87-4FD9-B6A3-7784DB263167}" type="datetimeFigureOut">
               <a:rPr lang="en-US" smtClean="0"/>
-              <a:t>3/9/2022</a:t>
+              <a:t>3/10/2022</a:t>
             </a:fld>
             <a:endParaRPr lang="en-US"/>
           </a:p>
@@ -9352,7 +9353,7 @@
           <a:p>
             <a:fld id="{43C97625-BF87-4FD9-B6A3-7784DB263167}" type="datetimeFigureOut">
               <a:rPr lang="en-US" smtClean="0"/>
-              <a:t>3/9/2022</a:t>
+              <a:t>3/10/2022</a:t>
             </a:fld>
             <a:endParaRPr lang="en-US"/>
           </a:p>
@@ -9465,7 +9466,7 @@
           <a:p>
             <a:fld id="{43C97625-BF87-4FD9-B6A3-7784DB263167}" type="datetimeFigureOut">
               <a:rPr lang="en-US" smtClean="0"/>
-              <a:t>3/9/2022</a:t>
+              <a:t>3/10/2022</a:t>
             </a:fld>
             <a:endParaRPr lang="en-US"/>
           </a:p>
@@ -9776,7 +9777,7 @@
           <a:p>
             <a:fld id="{43C97625-BF87-4FD9-B6A3-7784DB263167}" type="datetimeFigureOut">
               <a:rPr lang="en-US" smtClean="0"/>
-              <a:t>3/9/2022</a:t>
+              <a:t>3/10/2022</a:t>
             </a:fld>
             <a:endParaRPr lang="en-US"/>
           </a:p>
@@ -10064,7 +10065,7 @@
           <a:p>
             <a:fld id="{43C97625-BF87-4FD9-B6A3-7784DB263167}" type="datetimeFigureOut">
               <a:rPr lang="en-US" smtClean="0"/>
-              <a:t>3/9/2022</a:t>
+              <a:t>3/10/2022</a:t>
             </a:fld>
             <a:endParaRPr lang="en-US"/>
           </a:p>
@@ -10305,7 +10306,7 @@
           <a:p>
             <a:fld id="{43C97625-BF87-4FD9-B6A3-7784DB263167}" type="datetimeFigureOut">
               <a:rPr lang="en-US" smtClean="0"/>
-              <a:t>3/9/2022</a:t>
+              <a:t>3/10/2022</a:t>
             </a:fld>
             <a:endParaRPr lang="en-US"/>
           </a:p>
@@ -11101,7 +11102,12 @@
             <p:ph type="title"/>
           </p:nvPr>
         </p:nvSpPr>
-        <p:spPr/>
+        <p:spPr>
+          <a:xfrm>
+            <a:off x="216967" y="203975"/>
+            <a:ext cx="6651504" cy="954124"/>
+          </a:xfrm>
+        </p:spPr>
         <p:txBody>
           <a:bodyPr/>
           <a:lstStyle/>
@@ -11129,15 +11135,160 @@
             <p:ph idx="1"/>
           </p:nvPr>
         </p:nvSpPr>
-        <p:spPr/>
+        <p:spPr>
+          <a:xfrm>
+            <a:off x="838200" y="1825625"/>
+            <a:ext cx="6223686" cy="4351338"/>
+          </a:xfrm>
+        </p:spPr>
         <p:txBody>
-          <a:bodyPr/>
+          <a:bodyPr>
+            <a:normAutofit fontScale="55000" lnSpcReduction="20000"/>
+          </a:bodyPr>
           <a:lstStyle/>
           <a:p>
-            <a:endParaRPr lang="en-US"/>
+            <a:r>
+              <a:rPr lang="en-US" dirty="0"/>
+              <a:t>Project is about applying the Information visualization learnings and providing a poster</a:t>
+            </a:r>
+          </a:p>
+          <a:p>
+            <a:r>
+              <a:rPr lang="en-US" dirty="0"/>
+              <a:t>Data</a:t>
+            </a:r>
+          </a:p>
+          <a:p>
+            <a:pPr lvl="1"/>
+            <a:r>
+              <a:rPr lang="en-US" dirty="0"/>
+              <a:t>I choose to analyze the video game dataset and provide the analysis through poster</a:t>
+            </a:r>
+          </a:p>
+          <a:p>
+            <a:pPr lvl="1"/>
+            <a:r>
+              <a:rPr lang="en-US" dirty="0"/>
+              <a:t>Dataset has about 13 features</a:t>
+            </a:r>
+          </a:p>
+          <a:p>
+            <a:pPr lvl="1"/>
+            <a:r>
+              <a:rPr lang="en-US" dirty="0"/>
+              <a:t>Total of 16,720 observations are present</a:t>
+            </a:r>
+          </a:p>
+          <a:p>
+            <a:r>
+              <a:rPr lang="en-US" dirty="0"/>
+              <a:t>Data cleanup</a:t>
+            </a:r>
+          </a:p>
+          <a:p>
+            <a:pPr lvl="1"/>
+            <a:r>
+              <a:rPr lang="en-US" dirty="0"/>
+              <a:t>Filtered data to scope only 3 popular consoles (Relevant to business domain)</a:t>
+            </a:r>
+          </a:p>
+          <a:p>
+            <a:pPr lvl="1"/>
+            <a:r>
+              <a:rPr lang="en-US" dirty="0"/>
+              <a:t>Cleaned up larger text to use short acronyms to help with word cloud</a:t>
+            </a:r>
+          </a:p>
+          <a:p>
+            <a:r>
+              <a:rPr lang="en-US" dirty="0"/>
+              <a:t>Poster audience</a:t>
+            </a:r>
+          </a:p>
+          <a:p>
+            <a:pPr lvl="1"/>
+            <a:r>
+              <a:rPr lang="en-US" dirty="0"/>
+              <a:t>Poster is made in the form of story driven for a focused audience game developers and gaming studios to focus on the PlayStation development. </a:t>
+            </a:r>
+          </a:p>
+          <a:p>
+            <a:pPr lvl="1"/>
+            <a:r>
+              <a:rPr lang="en-US" dirty="0"/>
+              <a:t>Its also geared towards gaming enthusiasts to provide analytics on current generation gaming industry</a:t>
+            </a:r>
+          </a:p>
+          <a:p>
+            <a:r>
+              <a:rPr lang="en-US" dirty="0"/>
+              <a:t>Visualization Strategy</a:t>
+            </a:r>
+          </a:p>
+          <a:p>
+            <a:pPr lvl="1"/>
+            <a:r>
+              <a:rPr lang="en-US" dirty="0"/>
+              <a:t>Used 2 column layout</a:t>
+            </a:r>
+          </a:p>
+          <a:p>
+            <a:pPr lvl="1"/>
+            <a:r>
+              <a:rPr lang="en-US" dirty="0"/>
+              <a:t>Broke the rules to provide a center image to provide the theme of the poster</a:t>
+            </a:r>
+          </a:p>
+          <a:p>
+            <a:pPr lvl="1"/>
+            <a:r>
+              <a:rPr lang="en-US" dirty="0"/>
+              <a:t>Used pareto chars to provide a sense of scale of Sony and the rest of the gaming consoles</a:t>
+            </a:r>
+          </a:p>
+          <a:p>
+            <a:pPr lvl="1"/>
+            <a:r>
+              <a:rPr lang="en-US" dirty="0"/>
+              <a:t>Leveraged typography that resonates with the theme</a:t>
+            </a:r>
+          </a:p>
+          <a:p>
+            <a:pPr lvl="1"/>
+            <a:endParaRPr lang="en-US" dirty="0"/>
           </a:p>
         </p:txBody>
       </p:sp>
+      <p:pic>
+        <p:nvPicPr>
+          <p:cNvPr id="5" name="Picture 4">
+            <a:extLst>
+              <a:ext uri="{FF2B5EF4-FFF2-40B4-BE49-F238E27FC236}">
+                <a16:creationId xmlns:a16="http://schemas.microsoft.com/office/drawing/2014/main" id="{D9DEE958-AC88-4AAA-A0EE-2E458BAE566F}"/>
+              </a:ext>
+            </a:extLst>
+          </p:cNvPr>
+          <p:cNvPicPr>
+            <a:picLocks noChangeAspect="1"/>
+          </p:cNvPicPr>
+          <p:nvPr/>
+        </p:nvPicPr>
+        <p:blipFill>
+          <a:blip r:embed="rId2"/>
+          <a:stretch>
+            <a:fillRect/>
+          </a:stretch>
+        </p:blipFill>
+        <p:spPr>
+          <a:xfrm>
+            <a:off x="7638848" y="124239"/>
+            <a:ext cx="4426077" cy="6609521"/>
+          </a:xfrm>
+          <a:prstGeom prst="rect">
+            <a:avLst/>
+          </a:prstGeom>
+        </p:spPr>
+      </p:pic>
     </p:spTree>
     <p:extLst>
       <p:ext uri="{BB962C8B-B14F-4D97-AF65-F5344CB8AC3E}">
@@ -11152,6 +11303,161 @@
 </file>
 
 <file path=ppt/slides/slide13.xml><?xml version="1.0" encoding="utf-8"?>
+<p:sld xmlns:a="http://schemas.openxmlformats.org/drawingml/2006/main" xmlns:r="http://schemas.openxmlformats.org/officeDocument/2006/relationships" xmlns:p="http://schemas.openxmlformats.org/presentationml/2006/main">
+  <p:cSld>
+    <p:spTree>
+      <p:nvGrpSpPr>
+        <p:cNvPr id="1" name=""/>
+        <p:cNvGrpSpPr/>
+        <p:nvPr/>
+      </p:nvGrpSpPr>
+      <p:grpSpPr>
+        <a:xfrm>
+          <a:off x="0" y="0"/>
+          <a:ext cx="0" cy="0"/>
+          <a:chOff x="0" y="0"/>
+          <a:chExt cx="0" cy="0"/>
+        </a:xfrm>
+      </p:grpSpPr>
+      <p:sp>
+        <p:nvSpPr>
+          <p:cNvPr id="2" name="Title 1">
+            <a:extLst>
+              <a:ext uri="{FF2B5EF4-FFF2-40B4-BE49-F238E27FC236}">
+                <a16:creationId xmlns:a16="http://schemas.microsoft.com/office/drawing/2014/main" id="{49FE2134-C6D2-4152-BCFD-8FCE9E373E3F}"/>
+              </a:ext>
+            </a:extLst>
+          </p:cNvPr>
+          <p:cNvSpPr>
+            <a:spLocks noGrp="1"/>
+          </p:cNvSpPr>
+          <p:nvPr>
+            <p:ph type="title"/>
+          </p:nvPr>
+        </p:nvSpPr>
+        <p:spPr/>
+        <p:txBody>
+          <a:bodyPr/>
+          <a:lstStyle/>
+          <a:p>
+            <a:r>
+              <a:rPr lang="en-US" dirty="0"/>
+              <a:t>Learnings</a:t>
+            </a:r>
+          </a:p>
+        </p:txBody>
+      </p:sp>
+      <p:sp>
+        <p:nvSpPr>
+          <p:cNvPr id="3" name="Content Placeholder 2">
+            <a:extLst>
+              <a:ext uri="{FF2B5EF4-FFF2-40B4-BE49-F238E27FC236}">
+                <a16:creationId xmlns:a16="http://schemas.microsoft.com/office/drawing/2014/main" id="{D570530C-E841-419A-87F8-87E93048D0F0}"/>
+              </a:ext>
+            </a:extLst>
+          </p:cNvPr>
+          <p:cNvSpPr>
+            <a:spLocks noGrp="1"/>
+          </p:cNvSpPr>
+          <p:nvPr>
+            <p:ph idx="1"/>
+          </p:nvPr>
+        </p:nvSpPr>
+        <p:spPr/>
+        <p:txBody>
+          <a:bodyPr>
+            <a:normAutofit fontScale="92500" lnSpcReduction="10000"/>
+          </a:bodyPr>
+          <a:lstStyle/>
+          <a:p>
+            <a:r>
+              <a:rPr lang="en-US" dirty="0"/>
+              <a:t>Understood the importance of tell the right story with data</a:t>
+            </a:r>
+          </a:p>
+          <a:p>
+            <a:r>
+              <a:rPr lang="en-US" dirty="0"/>
+              <a:t>Understood the importance of the audience</a:t>
+            </a:r>
+          </a:p>
+          <a:p>
+            <a:r>
+              <a:rPr lang="en-US" dirty="0"/>
+              <a:t>Understood Visual design principles</a:t>
+            </a:r>
+          </a:p>
+          <a:p>
+            <a:pPr lvl="1"/>
+            <a:r>
+              <a:rPr lang="en-US" dirty="0"/>
+              <a:t>Visual Hierarchy (how to guide user navigation)</a:t>
+            </a:r>
+          </a:p>
+          <a:p>
+            <a:pPr lvl="1"/>
+            <a:r>
+              <a:rPr lang="en-US" dirty="0"/>
+              <a:t>Layout</a:t>
+            </a:r>
+          </a:p>
+          <a:p>
+            <a:pPr lvl="1"/>
+            <a:r>
+              <a:rPr lang="en-US" dirty="0"/>
+              <a:t>Composition</a:t>
+            </a:r>
+          </a:p>
+          <a:p>
+            <a:pPr lvl="1"/>
+            <a:r>
+              <a:rPr lang="en-US" dirty="0"/>
+              <a:t>Rule of thirds principle, Golden Ratio</a:t>
+            </a:r>
+          </a:p>
+          <a:p>
+            <a:pPr lvl="1"/>
+            <a:r>
+              <a:rPr lang="en-US" dirty="0"/>
+              <a:t>Typography</a:t>
+            </a:r>
+          </a:p>
+          <a:p>
+            <a:r>
+              <a:rPr lang="en-US" dirty="0"/>
+              <a:t>Learned how to enhance R plots to tell powerful stories using Adobe Illustrator</a:t>
+            </a:r>
+          </a:p>
+          <a:p>
+            <a:r>
+              <a:rPr lang="en-US" dirty="0"/>
+              <a:t>Grammar of graphics using </a:t>
+            </a:r>
+            <a:r>
+              <a:rPr lang="en-US" dirty="0" err="1"/>
+              <a:t>ggplot</a:t>
+            </a:r>
+            <a:r>
+              <a:rPr lang="en-US" dirty="0"/>
+              <a:t> package in R</a:t>
+            </a:r>
+          </a:p>
+        </p:txBody>
+      </p:sp>
+    </p:spTree>
+    <p:extLst>
+      <p:ext uri="{BB962C8B-B14F-4D97-AF65-F5344CB8AC3E}">
+        <p14:creationId xmlns:p14="http://schemas.microsoft.com/office/powerpoint/2010/main" val="1320824495"/>
+      </p:ext>
+    </p:extLst>
+  </p:cSld>
+  <p:clrMapOvr>
+    <a:masterClrMapping/>
+  </p:clrMapOvr>
+</p:sld>
+</file>
+
+<file path=ppt/slides/slide14.xml><?xml version="1.0" encoding="utf-8"?>
 <p:sld xmlns:a="http://schemas.openxmlformats.org/drawingml/2006/main" xmlns:r="http://schemas.openxmlformats.org/officeDocument/2006/relationships" xmlns:p="http://schemas.openxmlformats.org/presentationml/2006/main">
   <p:cSld>
     <p:spTree>
@@ -11240,7 +11546,7 @@
 </p:sld>
 </file>
 
-<file path=ppt/slides/slide14.xml><?xml version="1.0" encoding="utf-8"?>
+<file path=ppt/slides/slide15.xml><?xml version="1.0" encoding="utf-8"?>
 <p:sld xmlns:a="http://schemas.openxmlformats.org/drawingml/2006/main" xmlns:r="http://schemas.openxmlformats.org/officeDocument/2006/relationships" xmlns:p="http://schemas.openxmlformats.org/presentationml/2006/main">
   <p:cSld>
     <p:spTree>
@@ -11323,7 +11629,7 @@
 </p:sld>
 </file>
 
-<file path=ppt/slides/slide15.xml><?xml version="1.0" encoding="utf-8"?>
+<file path=ppt/slides/slide16.xml><?xml version="1.0" encoding="utf-8"?>
 <p:sld xmlns:a="http://schemas.openxmlformats.org/drawingml/2006/main" xmlns:r="http://schemas.openxmlformats.org/officeDocument/2006/relationships" xmlns:p="http://schemas.openxmlformats.org/presentationml/2006/main">
   <p:cSld>
     <p:spTree>
@@ -11671,7 +11977,7 @@
 </p:sld>
 </file>
 
-<file path=ppt/slides/slide16.xml><?xml version="1.0" encoding="utf-8"?>
+<file path=ppt/slides/slide17.xml><?xml version="1.0" encoding="utf-8"?>
 <p:sld xmlns:a="http://schemas.openxmlformats.org/drawingml/2006/main" xmlns:r="http://schemas.openxmlformats.org/officeDocument/2006/relationships" xmlns:p="http://schemas.openxmlformats.org/presentationml/2006/main">
   <p:cSld>
     <p:spTree>
@@ -11754,7 +12060,7 @@
 </p:sld>
 </file>
 
-<file path=ppt/slides/slide17.xml><?xml version="1.0" encoding="utf-8"?>
+<file path=ppt/slides/slide18.xml><?xml version="1.0" encoding="utf-8"?>
 <p:sld xmlns:a="http://schemas.openxmlformats.org/drawingml/2006/main" xmlns:r="http://schemas.openxmlformats.org/officeDocument/2006/relationships" xmlns:p="http://schemas.openxmlformats.org/presentationml/2006/main">
   <p:cSld>
     <p:spTree>
@@ -11817,15 +12123,17 @@
         </p:nvSpPr>
         <p:spPr/>
         <p:txBody>
-          <a:bodyPr/>
+          <a:bodyPr>
+            <a:normAutofit/>
+          </a:bodyPr>
           <a:lstStyle/>
           <a:p>
             <a:r>
-              <a:rPr lang="en-US" dirty="0"/>
+              <a:rPr lang="en-US" sz="2000" dirty="0"/>
               <a:t>HPA Kaggle competition: </a:t>
             </a:r>
             <a:r>
-              <a:rPr lang="en-US" sz="1800" u="sng" dirty="0">
+              <a:rPr lang="en-US" sz="2000" u="sng" dirty="0">
                 <a:solidFill>
                   <a:srgbClr val="0563C1"/>
                 </a:solidFill>
@@ -11837,7 +12145,7 @@
               </a:rPr>
               <a:t>https://www.kaggle.com/c/hpa-single-cell-image-classification</a:t>
             </a:r>
-            <a:endParaRPr lang="en-US" sz="1800" u="sng" dirty="0">
+            <a:endParaRPr lang="en-US" sz="2000" u="sng" dirty="0">
               <a:solidFill>
                 <a:srgbClr val="0563C1"/>
               </a:solidFill>
@@ -11848,7 +12156,20 @@
             </a:endParaRPr>
           </a:p>
           <a:p>
-            <a:endParaRPr lang="en-US" dirty="0"/>
+            <a:r>
+              <a:rPr lang="en-US" sz="2000" dirty="0"/>
+              <a:t>Video game dataset from Kaggle: </a:t>
+            </a:r>
+            <a:r>
+              <a:rPr lang="en-US" sz="2000" dirty="0">
+                <a:hlinkClick r:id="rId3"/>
+              </a:rPr>
+              <a:t>https://www.kaggle.com/sidtwr/videogames-sales-dataset</a:t>
+            </a:r>
+            <a:r>
+              <a:rPr lang="en-US" sz="2000" dirty="0"/>
+              <a:t> </a:t>
+            </a:r>
           </a:p>
         </p:txBody>
       </p:sp>
@@ -17371,21 +17692,6 @@
 </file>
 
 <file path=customXml/item1.xml><?xml version="1.0" encoding="utf-8"?>
-<p:properties xmlns:p="http://schemas.microsoft.com/office/2006/metadata/properties" xmlns:xsi="http://www.w3.org/2001/XMLSchema-instance" xmlns:pc="http://schemas.microsoft.com/office/infopath/2007/PartnerControls">
-  <documentManagement/>
-</p:properties>
-</file>
-
-<file path=customXml/item2.xml><?xml version="1.0" encoding="utf-8"?>
-<?mso-contentType ?>
-<FormTemplates xmlns="http://schemas.microsoft.com/sharepoint/v3/contenttype/forms">
-  <Display>DocumentLibraryForm</Display>
-  <Edit>DocumentLibraryForm</Edit>
-  <New>DocumentLibraryForm</New>
-</FormTemplates>
-</file>
-
-<file path=customXml/item3.xml><?xml version="1.0" encoding="utf-8"?>
 <ct:contentTypeSchema xmlns:ct="http://schemas.microsoft.com/office/2006/metadata/contentType" xmlns:ma="http://schemas.microsoft.com/office/2006/metadata/properties/metaAttributes" ct:_="" ma:_="" ma:contentTypeName="Document" ma:contentTypeID="0x0101006E7876CE5A991D42848489547AF4CBAE" ma:contentTypeVersion="7" ma:contentTypeDescription="Create a new document." ma:contentTypeScope="" ma:versionID="89cc19e11a35f1f1733091247c63d3c9">
   <xsd:schema xmlns:xsd="http://www.w3.org/2001/XMLSchema" xmlns:xs="http://www.w3.org/2001/XMLSchema" xmlns:p="http://schemas.microsoft.com/office/2006/metadata/properties" xmlns:ns3="7a2312a6-a8c3-41ac-9a29-150ba0710c9a" xmlns:ns4="45cf2939-8fa7-49e3-ad34-0c168c521b81" targetNamespace="http://schemas.microsoft.com/office/2006/metadata/properties" ma:root="true" ma:fieldsID="e83f5769af76e5bf1778458621af7ef9" ns3:_="" ns4:_="">
     <xsd:import namespace="7a2312a6-a8c3-41ac-9a29-150ba0710c9a"/>
@@ -17570,32 +17876,22 @@
 </ct:contentTypeSchema>
 </file>
 
-<file path=customXml/itemProps1.xml><?xml version="1.0" encoding="utf-8"?>
-<ds:datastoreItem xmlns:ds="http://schemas.openxmlformats.org/officeDocument/2006/customXml" ds:itemID="{B6CAC4AE-67DD-479D-A1E3-723FE1202C57}">
-  <ds:schemaRefs>
-    <ds:schemaRef ds:uri="http://www.w3.org/XML/1998/namespace"/>
-    <ds:schemaRef ds:uri="7a2312a6-a8c3-41ac-9a29-150ba0710c9a"/>
-    <ds:schemaRef ds:uri="http://schemas.microsoft.com/office/2006/documentManagement/types"/>
-    <ds:schemaRef ds:uri="http://purl.org/dc/terms/"/>
-    <ds:schemaRef ds:uri="http://schemas.microsoft.com/office/infopath/2007/PartnerControls"/>
-    <ds:schemaRef ds:uri="http://schemas.openxmlformats.org/package/2006/metadata/core-properties"/>
-    <ds:schemaRef ds:uri="http://purl.org/dc/elements/1.1/"/>
-    <ds:schemaRef ds:uri="45cf2939-8fa7-49e3-ad34-0c168c521b81"/>
-    <ds:schemaRef ds:uri="http://schemas.microsoft.com/office/2006/metadata/properties"/>
-    <ds:schemaRef ds:uri="http://purl.org/dc/dcmitype/"/>
-  </ds:schemaRefs>
-</ds:datastoreItem>
+<file path=customXml/item2.xml><?xml version="1.0" encoding="utf-8"?>
+<?mso-contentType ?>
+<FormTemplates xmlns="http://schemas.microsoft.com/sharepoint/v3/contenttype/forms">
+  <Display>DocumentLibraryForm</Display>
+  <Edit>DocumentLibraryForm</Edit>
+  <New>DocumentLibraryForm</New>
+</FormTemplates>
 </file>
 
-<file path=customXml/itemProps2.xml><?xml version="1.0" encoding="utf-8"?>
-<ds:datastoreItem xmlns:ds="http://schemas.openxmlformats.org/officeDocument/2006/customXml" ds:itemID="{42CA6DBA-0F9E-49D4-986C-16023887AF58}">
-  <ds:schemaRefs>
-    <ds:schemaRef ds:uri="http://schemas.microsoft.com/sharepoint/v3/contenttype/forms"/>
-  </ds:schemaRefs>
-</ds:datastoreItem>
+<file path=customXml/item3.xml><?xml version="1.0" encoding="utf-8"?>
+<p:properties xmlns:p="http://schemas.microsoft.com/office/2006/metadata/properties" xmlns:xsi="http://www.w3.org/2001/XMLSchema-instance" xmlns:pc="http://schemas.microsoft.com/office/infopath/2007/PartnerControls">
+  <documentManagement/>
+</p:properties>
 </file>
 
-<file path=customXml/itemProps3.xml><?xml version="1.0" encoding="utf-8"?>
+<file path=customXml/itemProps1.xml><?xml version="1.0" encoding="utf-8"?>
 <ds:datastoreItem xmlns:ds="http://schemas.openxmlformats.org/officeDocument/2006/customXml" ds:itemID="{C2021213-501F-43B0-98F1-FE78227F530C}">
   <ds:schemaRefs>
     <ds:schemaRef ds:uri="http://schemas.microsoft.com/office/2006/metadata/contentType"/>
@@ -17612,4 +17908,29 @@
     <ds:schemaRef ds:uri="http://schemas.microsoft.com/internal/obd"/>
   </ds:schemaRefs>
 </ds:datastoreItem>
+</file>
+
+<file path=customXml/itemProps2.xml><?xml version="1.0" encoding="utf-8"?>
+<ds:datastoreItem xmlns:ds="http://schemas.openxmlformats.org/officeDocument/2006/customXml" ds:itemID="{42CA6DBA-0F9E-49D4-986C-16023887AF58}">
+  <ds:schemaRefs>
+    <ds:schemaRef ds:uri="http://schemas.microsoft.com/sharepoint/v3/contenttype/forms"/>
+  </ds:schemaRefs>
+</ds:datastoreItem>
+</file>
+
+<file path=customXml/itemProps3.xml><?xml version="1.0" encoding="utf-8"?>
+<ds:datastoreItem xmlns:ds="http://schemas.openxmlformats.org/officeDocument/2006/customXml" ds:itemID="{B6CAC4AE-67DD-479D-A1E3-723FE1202C57}">
+  <ds:schemaRefs>
+    <ds:schemaRef ds:uri="http://www.w3.org/XML/1998/namespace"/>
+    <ds:schemaRef ds:uri="7a2312a6-a8c3-41ac-9a29-150ba0710c9a"/>
+    <ds:schemaRef ds:uri="http://schemas.microsoft.com/office/2006/documentManagement/types"/>
+    <ds:schemaRef ds:uri="http://purl.org/dc/terms/"/>
+    <ds:schemaRef ds:uri="http://schemas.microsoft.com/office/infopath/2007/PartnerControls"/>
+    <ds:schemaRef ds:uri="http://schemas.openxmlformats.org/package/2006/metadata/core-properties"/>
+    <ds:schemaRef ds:uri="http://purl.org/dc/elements/1.1/"/>
+    <ds:schemaRef ds:uri="45cf2939-8fa7-49e3-ad34-0c168c521b81"/>
+    <ds:schemaRef ds:uri="http://schemas.microsoft.com/office/2006/metadata/properties"/>
+    <ds:schemaRef ds:uri="http://purl.org/dc/dcmitype/"/>
+  </ds:schemaRefs>
+</ds:datastoreItem>
 </file>
</xml_diff>

<commit_message>
all details are in
</commit_message>
<xml_diff>
--- a/MS ADS.pptx
+++ b/MS ADS.pptx
@@ -7033,7 +7033,7 @@
           <a:p>
             <a:fld id="{C4EDFC01-9F45-445E-A8F1-81A112EE4F26}" type="datetimeFigureOut">
               <a:rPr lang="en-US" smtClean="0"/>
-              <a:t>3/10/2022</a:t>
+              <a:t>3/12/2022</a:t>
             </a:fld>
             <a:endParaRPr lang="en-US"/>
           </a:p>
@@ -7656,7 +7656,7 @@
           <a:p>
             <a:fld id="{43C97625-BF87-4FD9-B6A3-7784DB263167}" type="datetimeFigureOut">
               <a:rPr lang="en-US" smtClean="0"/>
-              <a:t>3/10/2022</a:t>
+              <a:t>3/12/2022</a:t>
             </a:fld>
             <a:endParaRPr lang="en-US"/>
           </a:p>
@@ -7854,7 +7854,7 @@
           <a:p>
             <a:fld id="{43C97625-BF87-4FD9-B6A3-7784DB263167}" type="datetimeFigureOut">
               <a:rPr lang="en-US" smtClean="0"/>
-              <a:t>3/10/2022</a:t>
+              <a:t>3/12/2022</a:t>
             </a:fld>
             <a:endParaRPr lang="en-US"/>
           </a:p>
@@ -8062,7 +8062,7 @@
           <a:p>
             <a:fld id="{43C97625-BF87-4FD9-B6A3-7784DB263167}" type="datetimeFigureOut">
               <a:rPr lang="en-US" smtClean="0"/>
-              <a:t>3/10/2022</a:t>
+              <a:t>3/12/2022</a:t>
             </a:fld>
             <a:endParaRPr lang="en-US"/>
           </a:p>
@@ -8260,7 +8260,7 @@
           <a:p>
             <a:fld id="{43C97625-BF87-4FD9-B6A3-7784DB263167}" type="datetimeFigureOut">
               <a:rPr lang="en-US" smtClean="0"/>
-              <a:t>3/10/2022</a:t>
+              <a:t>3/12/2022</a:t>
             </a:fld>
             <a:endParaRPr lang="en-US"/>
           </a:p>
@@ -8535,7 +8535,7 @@
           <a:p>
             <a:fld id="{43C97625-BF87-4FD9-B6A3-7784DB263167}" type="datetimeFigureOut">
               <a:rPr lang="en-US" smtClean="0"/>
-              <a:t>3/10/2022</a:t>
+              <a:t>3/12/2022</a:t>
             </a:fld>
             <a:endParaRPr lang="en-US"/>
           </a:p>
@@ -8800,7 +8800,7 @@
           <a:p>
             <a:fld id="{43C97625-BF87-4FD9-B6A3-7784DB263167}" type="datetimeFigureOut">
               <a:rPr lang="en-US" smtClean="0"/>
-              <a:t>3/10/2022</a:t>
+              <a:t>3/12/2022</a:t>
             </a:fld>
             <a:endParaRPr lang="en-US"/>
           </a:p>
@@ -9212,7 +9212,7 @@
           <a:p>
             <a:fld id="{43C97625-BF87-4FD9-B6A3-7784DB263167}" type="datetimeFigureOut">
               <a:rPr lang="en-US" smtClean="0"/>
-              <a:t>3/10/2022</a:t>
+              <a:t>3/12/2022</a:t>
             </a:fld>
             <a:endParaRPr lang="en-US"/>
           </a:p>
@@ -9353,7 +9353,7 @@
           <a:p>
             <a:fld id="{43C97625-BF87-4FD9-B6A3-7784DB263167}" type="datetimeFigureOut">
               <a:rPr lang="en-US" smtClean="0"/>
-              <a:t>3/10/2022</a:t>
+              <a:t>3/12/2022</a:t>
             </a:fld>
             <a:endParaRPr lang="en-US"/>
           </a:p>
@@ -9466,7 +9466,7 @@
           <a:p>
             <a:fld id="{43C97625-BF87-4FD9-B6A3-7784DB263167}" type="datetimeFigureOut">
               <a:rPr lang="en-US" smtClean="0"/>
-              <a:t>3/10/2022</a:t>
+              <a:t>3/12/2022</a:t>
             </a:fld>
             <a:endParaRPr lang="en-US"/>
           </a:p>
@@ -9777,7 +9777,7 @@
           <a:p>
             <a:fld id="{43C97625-BF87-4FD9-B6A3-7784DB263167}" type="datetimeFigureOut">
               <a:rPr lang="en-US" smtClean="0"/>
-              <a:t>3/10/2022</a:t>
+              <a:t>3/12/2022</a:t>
             </a:fld>
             <a:endParaRPr lang="en-US"/>
           </a:p>
@@ -10065,7 +10065,7 @@
           <a:p>
             <a:fld id="{43C97625-BF87-4FD9-B6A3-7784DB263167}" type="datetimeFigureOut">
               <a:rPr lang="en-US" smtClean="0"/>
-              <a:t>3/10/2022</a:t>
+              <a:t>3/12/2022</a:t>
             </a:fld>
             <a:endParaRPr lang="en-US"/>
           </a:p>
@@ -10306,7 +10306,7 @@
           <a:p>
             <a:fld id="{43C97625-BF87-4FD9-B6A3-7784DB263167}" type="datetimeFigureOut">
               <a:rPr lang="en-US" smtClean="0"/>
-              <a:t>3/10/2022</a:t>
+              <a:t>3/12/2022</a:t>
             </a:fld>
             <a:endParaRPr lang="en-US"/>
           </a:p>
@@ -10709,6 +10709,11 @@
 <file path=ppt/slides/slide1.xml><?xml version="1.0" encoding="utf-8"?>
 <p:sld xmlns:a="http://schemas.openxmlformats.org/drawingml/2006/main" xmlns:r="http://schemas.openxmlformats.org/officeDocument/2006/relationships" xmlns:p="http://schemas.openxmlformats.org/presentationml/2006/main">
   <p:cSld>
+    <p:bg>
+      <p:bgRef idx="1001">
+        <a:schemeClr val="bg1"/>
+      </p:bgRef>
+    </p:bg>
     <p:spTree>
       <p:nvGrpSpPr>
         <p:cNvPr id="1" name=""/>
@@ -10792,6 +10797,15 @@
               <a:t>SUID # 742162654</a:t>
             </a:r>
           </a:p>
+          <a:p>
+            <a:r>
+              <a:rPr lang="en-US" sz="1600" dirty="0"/>
+              <a:t>LinkedIn: https://www.linkedin.com/in/srihari-busam/</a:t>
+            </a:r>
+          </a:p>
+          <a:p>
+            <a:endParaRPr lang="en-US" dirty="0"/>
+          </a:p>
         </p:txBody>
       </p:sp>
     </p:spTree>
@@ -10802,7 +10816,7 @@
     </p:extLst>
   </p:cSld>
   <p:clrMapOvr>
-    <a:masterClrMapping/>
+    <a:overrideClrMapping bg1="lt1" tx1="dk1" bg2="lt2" tx2="dk2" accent1="accent1" accent2="accent2" accent3="accent3" accent4="accent4" accent5="accent5" accent6="accent6" hlink="hlink" folHlink="folHlink"/>
   </p:clrMapOvr>
 </p:sld>
 </file>
@@ -11502,7 +11516,7 @@
                 <a:latin typeface="Calibri" panose="020F0502020204030204" pitchFamily="34" charset="0"/>
                 <a:cs typeface="Times New Roman" panose="02020603050405020304" pitchFamily="18" charset="0"/>
               </a:rPr>
-              <a:t>Hands-on experience  on modern Databases</a:t>
+              <a:t>IST769: Modern Database systems</a:t>
             </a:r>
             <a:endParaRPr lang="en-US" dirty="0"/>
           </a:p>
@@ -11524,12 +11538,320 @@
             <p:ph idx="1"/>
           </p:nvPr>
         </p:nvSpPr>
-        <p:spPr/>
+        <p:spPr>
+          <a:xfrm>
+            <a:off x="838200" y="1825625"/>
+            <a:ext cx="4774035" cy="4351338"/>
+          </a:xfrm>
+        </p:spPr>
         <p:txBody>
           <a:bodyPr/>
           <a:lstStyle/>
           <a:p>
-            <a:endParaRPr lang="en-US" dirty="0"/>
+            <a:r>
+              <a:rPr lang="en-US" dirty="0"/>
+              <a:t>The 3 Vs of Big Data</a:t>
+            </a:r>
+          </a:p>
+          <a:p>
+            <a:pPr lvl="1"/>
+            <a:r>
+              <a:rPr lang="en-US" dirty="0"/>
+              <a:t>Volume, Velocity, Variety</a:t>
+            </a:r>
+          </a:p>
+          <a:p>
+            <a:r>
+              <a:rPr lang="en-US" dirty="0"/>
+              <a:t>SQL vs NoSQL</a:t>
+            </a:r>
+          </a:p>
+          <a:p>
+            <a:pPr lvl="1"/>
+            <a:r>
+              <a:rPr lang="en-US" dirty="0"/>
+              <a:t>Design for storage efficiency</a:t>
+            </a:r>
+          </a:p>
+          <a:p>
+            <a:pPr lvl="1"/>
+            <a:r>
+              <a:rPr lang="en-US" dirty="0"/>
+              <a:t>Design for query efficiency</a:t>
+            </a:r>
+          </a:p>
+          <a:p>
+            <a:r>
+              <a:rPr lang="en-US" dirty="0"/>
+              <a:t>CAP theorem</a:t>
+            </a:r>
+          </a:p>
+          <a:p>
+            <a:r>
+              <a:rPr lang="en-US" dirty="0"/>
+              <a:t>ETL, Data Engineering</a:t>
+            </a:r>
+          </a:p>
+          <a:p>
+            <a:r>
+              <a:rPr lang="en-US" dirty="0"/>
+              <a:t>Batch processing, Stream processing</a:t>
+            </a:r>
+          </a:p>
+        </p:txBody>
+      </p:sp>
+      <p:sp>
+        <p:nvSpPr>
+          <p:cNvPr id="4" name="Content Placeholder 2">
+            <a:extLst>
+              <a:ext uri="{FF2B5EF4-FFF2-40B4-BE49-F238E27FC236}">
+                <a16:creationId xmlns:a16="http://schemas.microsoft.com/office/drawing/2014/main" id="{F0A2953E-76F2-4BE6-BD37-FBE64FB8ECCD}"/>
+              </a:ext>
+            </a:extLst>
+          </p:cNvPr>
+          <p:cNvSpPr txBox="1">
+            <a:spLocks/>
+          </p:cNvSpPr>
+          <p:nvPr/>
+        </p:nvSpPr>
+        <p:spPr>
+          <a:xfrm>
+            <a:off x="6579767" y="1825625"/>
+            <a:ext cx="4774035" cy="4351338"/>
+          </a:xfrm>
+          <a:prstGeom prst="rect">
+            <a:avLst/>
+          </a:prstGeom>
+        </p:spPr>
+        <p:txBody>
+          <a:bodyPr vert="horz" lIns="91440" tIns="45720" rIns="91440" bIns="45720" rtlCol="0">
+            <a:normAutofit/>
+          </a:bodyPr>
+          <a:lstStyle>
+            <a:lvl1pPr marL="228600" indent="-228600" algn="l" defTabSz="914400" rtl="0" eaLnBrk="1" latinLnBrk="0" hangingPunct="1">
+              <a:lnSpc>
+                <a:spcPct val="90000"/>
+              </a:lnSpc>
+              <a:spcBef>
+                <a:spcPts val="1000"/>
+              </a:spcBef>
+              <a:buFont typeface="Arial" panose="020B0604020202020204" pitchFamily="34" charset="0"/>
+              <a:buChar char="•"/>
+              <a:defRPr sz="2800" kern="1200">
+                <a:solidFill>
+                  <a:schemeClr val="tx1"/>
+                </a:solidFill>
+                <a:latin typeface="+mn-lt"/>
+                <a:ea typeface="+mn-ea"/>
+                <a:cs typeface="+mn-cs"/>
+              </a:defRPr>
+            </a:lvl1pPr>
+            <a:lvl2pPr marL="685800" indent="-228600" algn="l" defTabSz="914400" rtl="0" eaLnBrk="1" latinLnBrk="0" hangingPunct="1">
+              <a:lnSpc>
+                <a:spcPct val="90000"/>
+              </a:lnSpc>
+              <a:spcBef>
+                <a:spcPts val="500"/>
+              </a:spcBef>
+              <a:buFont typeface="Arial" panose="020B0604020202020204" pitchFamily="34" charset="0"/>
+              <a:buChar char="•"/>
+              <a:defRPr sz="2400" kern="1200">
+                <a:solidFill>
+                  <a:schemeClr val="tx1"/>
+                </a:solidFill>
+                <a:latin typeface="+mn-lt"/>
+                <a:ea typeface="+mn-ea"/>
+                <a:cs typeface="+mn-cs"/>
+              </a:defRPr>
+            </a:lvl2pPr>
+            <a:lvl3pPr marL="1143000" indent="-228600" algn="l" defTabSz="914400" rtl="0" eaLnBrk="1" latinLnBrk="0" hangingPunct="1">
+              <a:lnSpc>
+                <a:spcPct val="90000"/>
+              </a:lnSpc>
+              <a:spcBef>
+                <a:spcPts val="500"/>
+              </a:spcBef>
+              <a:buFont typeface="Arial" panose="020B0604020202020204" pitchFamily="34" charset="0"/>
+              <a:buChar char="•"/>
+              <a:defRPr sz="2000" kern="1200">
+                <a:solidFill>
+                  <a:schemeClr val="tx1"/>
+                </a:solidFill>
+                <a:latin typeface="+mn-lt"/>
+                <a:ea typeface="+mn-ea"/>
+                <a:cs typeface="+mn-cs"/>
+              </a:defRPr>
+            </a:lvl3pPr>
+            <a:lvl4pPr marL="1600200" indent="-228600" algn="l" defTabSz="914400" rtl="0" eaLnBrk="1" latinLnBrk="0" hangingPunct="1">
+              <a:lnSpc>
+                <a:spcPct val="90000"/>
+              </a:lnSpc>
+              <a:spcBef>
+                <a:spcPts val="500"/>
+              </a:spcBef>
+              <a:buFont typeface="Arial" panose="020B0604020202020204" pitchFamily="34" charset="0"/>
+              <a:buChar char="•"/>
+              <a:defRPr sz="1800" kern="1200">
+                <a:solidFill>
+                  <a:schemeClr val="tx1"/>
+                </a:solidFill>
+                <a:latin typeface="+mn-lt"/>
+                <a:ea typeface="+mn-ea"/>
+                <a:cs typeface="+mn-cs"/>
+              </a:defRPr>
+            </a:lvl4pPr>
+            <a:lvl5pPr marL="2057400" indent="-228600" algn="l" defTabSz="914400" rtl="0" eaLnBrk="1" latinLnBrk="0" hangingPunct="1">
+              <a:lnSpc>
+                <a:spcPct val="90000"/>
+              </a:lnSpc>
+              <a:spcBef>
+                <a:spcPts val="500"/>
+              </a:spcBef>
+              <a:buFont typeface="Arial" panose="020B0604020202020204" pitchFamily="34" charset="0"/>
+              <a:buChar char="•"/>
+              <a:defRPr sz="1800" kern="1200">
+                <a:solidFill>
+                  <a:schemeClr val="tx1"/>
+                </a:solidFill>
+                <a:latin typeface="+mn-lt"/>
+                <a:ea typeface="+mn-ea"/>
+                <a:cs typeface="+mn-cs"/>
+              </a:defRPr>
+            </a:lvl5pPr>
+            <a:lvl6pPr marL="2514600" indent="-228600" algn="l" defTabSz="914400" rtl="0" eaLnBrk="1" latinLnBrk="0" hangingPunct="1">
+              <a:lnSpc>
+                <a:spcPct val="90000"/>
+              </a:lnSpc>
+              <a:spcBef>
+                <a:spcPts val="500"/>
+              </a:spcBef>
+              <a:buFont typeface="Arial" panose="020B0604020202020204" pitchFamily="34" charset="0"/>
+              <a:buChar char="•"/>
+              <a:defRPr sz="1800" kern="1200">
+                <a:solidFill>
+                  <a:schemeClr val="tx1"/>
+                </a:solidFill>
+                <a:latin typeface="+mn-lt"/>
+                <a:ea typeface="+mn-ea"/>
+                <a:cs typeface="+mn-cs"/>
+              </a:defRPr>
+            </a:lvl6pPr>
+            <a:lvl7pPr marL="2971800" indent="-228600" algn="l" defTabSz="914400" rtl="0" eaLnBrk="1" latinLnBrk="0" hangingPunct="1">
+              <a:lnSpc>
+                <a:spcPct val="90000"/>
+              </a:lnSpc>
+              <a:spcBef>
+                <a:spcPts val="500"/>
+              </a:spcBef>
+              <a:buFont typeface="Arial" panose="020B0604020202020204" pitchFamily="34" charset="0"/>
+              <a:buChar char="•"/>
+              <a:defRPr sz="1800" kern="1200">
+                <a:solidFill>
+                  <a:schemeClr val="tx1"/>
+                </a:solidFill>
+                <a:latin typeface="+mn-lt"/>
+                <a:ea typeface="+mn-ea"/>
+                <a:cs typeface="+mn-cs"/>
+              </a:defRPr>
+            </a:lvl7pPr>
+            <a:lvl8pPr marL="3429000" indent="-228600" algn="l" defTabSz="914400" rtl="0" eaLnBrk="1" latinLnBrk="0" hangingPunct="1">
+              <a:lnSpc>
+                <a:spcPct val="90000"/>
+              </a:lnSpc>
+              <a:spcBef>
+                <a:spcPts val="500"/>
+              </a:spcBef>
+              <a:buFont typeface="Arial" panose="020B0604020202020204" pitchFamily="34" charset="0"/>
+              <a:buChar char="•"/>
+              <a:defRPr sz="1800" kern="1200">
+                <a:solidFill>
+                  <a:schemeClr val="tx1"/>
+                </a:solidFill>
+                <a:latin typeface="+mn-lt"/>
+                <a:ea typeface="+mn-ea"/>
+                <a:cs typeface="+mn-cs"/>
+              </a:defRPr>
+            </a:lvl8pPr>
+            <a:lvl9pPr marL="3886200" indent="-228600" algn="l" defTabSz="914400" rtl="0" eaLnBrk="1" latinLnBrk="0" hangingPunct="1">
+              <a:lnSpc>
+                <a:spcPct val="90000"/>
+              </a:lnSpc>
+              <a:spcBef>
+                <a:spcPts val="500"/>
+              </a:spcBef>
+              <a:buFont typeface="Arial" panose="020B0604020202020204" pitchFamily="34" charset="0"/>
+              <a:buChar char="•"/>
+              <a:defRPr sz="1800" kern="1200">
+                <a:solidFill>
+                  <a:schemeClr val="tx1"/>
+                </a:solidFill>
+                <a:latin typeface="+mn-lt"/>
+                <a:ea typeface="+mn-ea"/>
+                <a:cs typeface="+mn-cs"/>
+              </a:defRPr>
+            </a:lvl9pPr>
+          </a:lstStyle>
+          <a:p>
+            <a:r>
+              <a:rPr lang="en-US" dirty="0"/>
+              <a:t>Databases covered</a:t>
+            </a:r>
+          </a:p>
+          <a:p>
+            <a:pPr lvl="1"/>
+            <a:r>
+              <a:rPr lang="en-US" dirty="0"/>
+              <a:t>MS SQL Server Advanced features</a:t>
+            </a:r>
+          </a:p>
+          <a:p>
+            <a:pPr lvl="1"/>
+            <a:r>
+              <a:rPr lang="en-US" dirty="0"/>
+              <a:t>Hadoop Ecosystem</a:t>
+            </a:r>
+          </a:p>
+          <a:p>
+            <a:pPr lvl="2"/>
+            <a:r>
+              <a:rPr lang="en-US" dirty="0"/>
+              <a:t>Pig</a:t>
+            </a:r>
+          </a:p>
+          <a:p>
+            <a:pPr lvl="2"/>
+            <a:r>
+              <a:rPr lang="en-US" dirty="0"/>
+              <a:t>HBase</a:t>
+            </a:r>
+          </a:p>
+          <a:p>
+            <a:pPr lvl="2"/>
+            <a:r>
+              <a:rPr lang="en-US" dirty="0"/>
+              <a:t>Hive, Impala </a:t>
+            </a:r>
+          </a:p>
+          <a:p>
+            <a:pPr lvl="1"/>
+            <a:r>
+              <a:rPr lang="en-US" dirty="0"/>
+              <a:t>MongoDB</a:t>
+            </a:r>
+          </a:p>
+          <a:p>
+            <a:pPr lvl="1"/>
+            <a:r>
+              <a:rPr lang="en-US" dirty="0"/>
+              <a:t>Cassandra</a:t>
+            </a:r>
+          </a:p>
+          <a:p>
+            <a:pPr lvl="1"/>
+            <a:r>
+              <a:rPr lang="en-US" dirty="0"/>
+              <a:t>Kafka</a:t>
+            </a:r>
           </a:p>
         </p:txBody>
       </p:sp>
@@ -11586,7 +11908,7 @@
           <a:p>
             <a:r>
               <a:rPr lang="en-US" dirty="0"/>
-              <a:t>About some of the other classes</a:t>
+              <a:t>Key concepts learned in the course</a:t>
             </a:r>
           </a:p>
         </p:txBody>
@@ -11607,12 +11929,424 @@
             <p:ph idx="1"/>
           </p:nvPr>
         </p:nvSpPr>
-        <p:spPr/>
+        <p:spPr>
+          <a:xfrm>
+            <a:off x="838200" y="1825625"/>
+            <a:ext cx="5257800" cy="4351338"/>
+          </a:xfrm>
+        </p:spPr>
         <p:txBody>
-          <a:bodyPr/>
+          <a:bodyPr>
+            <a:normAutofit fontScale="92500" lnSpcReduction="20000"/>
+          </a:bodyPr>
           <a:lstStyle/>
           <a:p>
-            <a:endParaRPr lang="en-US"/>
+            <a:r>
+              <a:rPr lang="en-US" dirty="0"/>
+              <a:t>Data science</a:t>
+            </a:r>
+          </a:p>
+          <a:p>
+            <a:pPr lvl="1"/>
+            <a:r>
+              <a:rPr lang="en-US" dirty="0"/>
+              <a:t>Sourcing data</a:t>
+            </a:r>
+          </a:p>
+          <a:p>
+            <a:pPr lvl="1"/>
+            <a:r>
+              <a:rPr lang="en-US" dirty="0"/>
+              <a:t>Processing the data (Big data)</a:t>
+            </a:r>
+          </a:p>
+          <a:p>
+            <a:pPr lvl="2"/>
+            <a:r>
+              <a:rPr lang="en-US" dirty="0"/>
+              <a:t>Cleaning</a:t>
+            </a:r>
+          </a:p>
+          <a:p>
+            <a:pPr lvl="2"/>
+            <a:r>
+              <a:rPr lang="en-US" dirty="0"/>
+              <a:t>Transforming</a:t>
+            </a:r>
+          </a:p>
+          <a:p>
+            <a:pPr lvl="2"/>
+            <a:r>
+              <a:rPr lang="en-US" dirty="0"/>
+              <a:t>Sampling (stratification)</a:t>
+            </a:r>
+          </a:p>
+          <a:p>
+            <a:pPr lvl="1"/>
+            <a:r>
+              <a:rPr lang="en-US" dirty="0"/>
+              <a:t>Framing the research question</a:t>
+            </a:r>
+          </a:p>
+          <a:p>
+            <a:pPr lvl="1"/>
+            <a:r>
+              <a:rPr lang="en-US" dirty="0"/>
+              <a:t>Understanding domain</a:t>
+            </a:r>
+          </a:p>
+          <a:p>
+            <a:pPr lvl="1"/>
+            <a:r>
+              <a:rPr lang="en-US" dirty="0"/>
+              <a:t>Perform Exploratory Data Analysis</a:t>
+            </a:r>
+          </a:p>
+          <a:p>
+            <a:pPr lvl="1"/>
+            <a:r>
+              <a:rPr lang="en-US" dirty="0"/>
+              <a:t>Building models</a:t>
+            </a:r>
+          </a:p>
+          <a:p>
+            <a:pPr lvl="1"/>
+            <a:r>
+              <a:rPr lang="en-US" dirty="0"/>
+              <a:t>Testing, Validating, Comparison of models and model optimization. </a:t>
+            </a:r>
+          </a:p>
+          <a:p>
+            <a:pPr lvl="1"/>
+            <a:r>
+              <a:rPr lang="en-US" dirty="0"/>
+              <a:t>Visualization</a:t>
+            </a:r>
+          </a:p>
+          <a:p>
+            <a:pPr lvl="2"/>
+            <a:r>
+              <a:rPr lang="en-US" dirty="0"/>
+              <a:t>Tell the right story to the audience</a:t>
+            </a:r>
+          </a:p>
+          <a:p>
+            <a:pPr lvl="1"/>
+            <a:endParaRPr lang="en-US" dirty="0"/>
+          </a:p>
+          <a:p>
+            <a:pPr lvl="1"/>
+            <a:endParaRPr lang="en-US" dirty="0"/>
+          </a:p>
+        </p:txBody>
+      </p:sp>
+      <p:sp>
+        <p:nvSpPr>
+          <p:cNvPr id="5" name="Content Placeholder 2">
+            <a:extLst>
+              <a:ext uri="{FF2B5EF4-FFF2-40B4-BE49-F238E27FC236}">
+                <a16:creationId xmlns:a16="http://schemas.microsoft.com/office/drawing/2014/main" id="{1BE0EE33-4BAA-4C96-8FED-2F4CA5B64602}"/>
+              </a:ext>
+            </a:extLst>
+          </p:cNvPr>
+          <p:cNvSpPr txBox="1">
+            <a:spLocks/>
+          </p:cNvSpPr>
+          <p:nvPr/>
+        </p:nvSpPr>
+        <p:spPr>
+          <a:xfrm>
+            <a:off x="6242108" y="2007368"/>
+            <a:ext cx="5257800" cy="4351338"/>
+          </a:xfrm>
+          <a:prstGeom prst="rect">
+            <a:avLst/>
+          </a:prstGeom>
+        </p:spPr>
+        <p:txBody>
+          <a:bodyPr vert="horz" lIns="91440" tIns="45720" rIns="91440" bIns="45720" rtlCol="0">
+            <a:normAutofit fontScale="85000" lnSpcReduction="20000"/>
+          </a:bodyPr>
+          <a:lstStyle>
+            <a:lvl1pPr marL="228600" indent="-228600" algn="l" defTabSz="914400" rtl="0" eaLnBrk="1" latinLnBrk="0" hangingPunct="1">
+              <a:lnSpc>
+                <a:spcPct val="90000"/>
+              </a:lnSpc>
+              <a:spcBef>
+                <a:spcPts val="1000"/>
+              </a:spcBef>
+              <a:buFont typeface="Arial" panose="020B0604020202020204" pitchFamily="34" charset="0"/>
+              <a:buChar char="•"/>
+              <a:defRPr sz="2800" kern="1200">
+                <a:solidFill>
+                  <a:schemeClr val="tx1"/>
+                </a:solidFill>
+                <a:latin typeface="+mn-lt"/>
+                <a:ea typeface="+mn-ea"/>
+                <a:cs typeface="+mn-cs"/>
+              </a:defRPr>
+            </a:lvl1pPr>
+            <a:lvl2pPr marL="685800" indent="-228600" algn="l" defTabSz="914400" rtl="0" eaLnBrk="1" latinLnBrk="0" hangingPunct="1">
+              <a:lnSpc>
+                <a:spcPct val="90000"/>
+              </a:lnSpc>
+              <a:spcBef>
+                <a:spcPts val="500"/>
+              </a:spcBef>
+              <a:buFont typeface="Arial" panose="020B0604020202020204" pitchFamily="34" charset="0"/>
+              <a:buChar char="•"/>
+              <a:defRPr sz="2400" kern="1200">
+                <a:solidFill>
+                  <a:schemeClr val="tx1"/>
+                </a:solidFill>
+                <a:latin typeface="+mn-lt"/>
+                <a:ea typeface="+mn-ea"/>
+                <a:cs typeface="+mn-cs"/>
+              </a:defRPr>
+            </a:lvl2pPr>
+            <a:lvl3pPr marL="1143000" indent="-228600" algn="l" defTabSz="914400" rtl="0" eaLnBrk="1" latinLnBrk="0" hangingPunct="1">
+              <a:lnSpc>
+                <a:spcPct val="90000"/>
+              </a:lnSpc>
+              <a:spcBef>
+                <a:spcPts val="500"/>
+              </a:spcBef>
+              <a:buFont typeface="Arial" panose="020B0604020202020204" pitchFamily="34" charset="0"/>
+              <a:buChar char="•"/>
+              <a:defRPr sz="2000" kern="1200">
+                <a:solidFill>
+                  <a:schemeClr val="tx1"/>
+                </a:solidFill>
+                <a:latin typeface="+mn-lt"/>
+                <a:ea typeface="+mn-ea"/>
+                <a:cs typeface="+mn-cs"/>
+              </a:defRPr>
+            </a:lvl3pPr>
+            <a:lvl4pPr marL="1600200" indent="-228600" algn="l" defTabSz="914400" rtl="0" eaLnBrk="1" latinLnBrk="0" hangingPunct="1">
+              <a:lnSpc>
+                <a:spcPct val="90000"/>
+              </a:lnSpc>
+              <a:spcBef>
+                <a:spcPts val="500"/>
+              </a:spcBef>
+              <a:buFont typeface="Arial" panose="020B0604020202020204" pitchFamily="34" charset="0"/>
+              <a:buChar char="•"/>
+              <a:defRPr sz="1800" kern="1200">
+                <a:solidFill>
+                  <a:schemeClr val="tx1"/>
+                </a:solidFill>
+                <a:latin typeface="+mn-lt"/>
+                <a:ea typeface="+mn-ea"/>
+                <a:cs typeface="+mn-cs"/>
+              </a:defRPr>
+            </a:lvl4pPr>
+            <a:lvl5pPr marL="2057400" indent="-228600" algn="l" defTabSz="914400" rtl="0" eaLnBrk="1" latinLnBrk="0" hangingPunct="1">
+              <a:lnSpc>
+                <a:spcPct val="90000"/>
+              </a:lnSpc>
+              <a:spcBef>
+                <a:spcPts val="500"/>
+              </a:spcBef>
+              <a:buFont typeface="Arial" panose="020B0604020202020204" pitchFamily="34" charset="0"/>
+              <a:buChar char="•"/>
+              <a:defRPr sz="1800" kern="1200">
+                <a:solidFill>
+                  <a:schemeClr val="tx1"/>
+                </a:solidFill>
+                <a:latin typeface="+mn-lt"/>
+                <a:ea typeface="+mn-ea"/>
+                <a:cs typeface="+mn-cs"/>
+              </a:defRPr>
+            </a:lvl5pPr>
+            <a:lvl6pPr marL="2514600" indent="-228600" algn="l" defTabSz="914400" rtl="0" eaLnBrk="1" latinLnBrk="0" hangingPunct="1">
+              <a:lnSpc>
+                <a:spcPct val="90000"/>
+              </a:lnSpc>
+              <a:spcBef>
+                <a:spcPts val="500"/>
+              </a:spcBef>
+              <a:buFont typeface="Arial" panose="020B0604020202020204" pitchFamily="34" charset="0"/>
+              <a:buChar char="•"/>
+              <a:defRPr sz="1800" kern="1200">
+                <a:solidFill>
+                  <a:schemeClr val="tx1"/>
+                </a:solidFill>
+                <a:latin typeface="+mn-lt"/>
+                <a:ea typeface="+mn-ea"/>
+                <a:cs typeface="+mn-cs"/>
+              </a:defRPr>
+            </a:lvl6pPr>
+            <a:lvl7pPr marL="2971800" indent="-228600" algn="l" defTabSz="914400" rtl="0" eaLnBrk="1" latinLnBrk="0" hangingPunct="1">
+              <a:lnSpc>
+                <a:spcPct val="90000"/>
+              </a:lnSpc>
+              <a:spcBef>
+                <a:spcPts val="500"/>
+              </a:spcBef>
+              <a:buFont typeface="Arial" panose="020B0604020202020204" pitchFamily="34" charset="0"/>
+              <a:buChar char="•"/>
+              <a:defRPr sz="1800" kern="1200">
+                <a:solidFill>
+                  <a:schemeClr val="tx1"/>
+                </a:solidFill>
+                <a:latin typeface="+mn-lt"/>
+                <a:ea typeface="+mn-ea"/>
+                <a:cs typeface="+mn-cs"/>
+              </a:defRPr>
+            </a:lvl7pPr>
+            <a:lvl8pPr marL="3429000" indent="-228600" algn="l" defTabSz="914400" rtl="0" eaLnBrk="1" latinLnBrk="0" hangingPunct="1">
+              <a:lnSpc>
+                <a:spcPct val="90000"/>
+              </a:lnSpc>
+              <a:spcBef>
+                <a:spcPts val="500"/>
+              </a:spcBef>
+              <a:buFont typeface="Arial" panose="020B0604020202020204" pitchFamily="34" charset="0"/>
+              <a:buChar char="•"/>
+              <a:defRPr sz="1800" kern="1200">
+                <a:solidFill>
+                  <a:schemeClr val="tx1"/>
+                </a:solidFill>
+                <a:latin typeface="+mn-lt"/>
+                <a:ea typeface="+mn-ea"/>
+                <a:cs typeface="+mn-cs"/>
+              </a:defRPr>
+            </a:lvl8pPr>
+            <a:lvl9pPr marL="3886200" indent="-228600" algn="l" defTabSz="914400" rtl="0" eaLnBrk="1" latinLnBrk="0" hangingPunct="1">
+              <a:lnSpc>
+                <a:spcPct val="90000"/>
+              </a:lnSpc>
+              <a:spcBef>
+                <a:spcPts val="500"/>
+              </a:spcBef>
+              <a:buFont typeface="Arial" panose="020B0604020202020204" pitchFamily="34" charset="0"/>
+              <a:buChar char="•"/>
+              <a:defRPr sz="1800" kern="1200">
+                <a:solidFill>
+                  <a:schemeClr val="tx1"/>
+                </a:solidFill>
+                <a:latin typeface="+mn-lt"/>
+                <a:ea typeface="+mn-ea"/>
+                <a:cs typeface="+mn-cs"/>
+              </a:defRPr>
+            </a:lvl9pPr>
+          </a:lstStyle>
+          <a:p>
+            <a:pPr lvl="1"/>
+            <a:r>
+              <a:rPr lang="en-US" dirty="0"/>
+              <a:t>Model building and analysis related to</a:t>
+            </a:r>
+          </a:p>
+          <a:p>
+            <a:pPr lvl="2"/>
+            <a:r>
+              <a:rPr lang="en-US" dirty="0"/>
+              <a:t>Multivariate regression analysis</a:t>
+            </a:r>
+          </a:p>
+          <a:p>
+            <a:pPr lvl="2"/>
+            <a:r>
+              <a:rPr lang="en-US" dirty="0"/>
+              <a:t>Classification</a:t>
+            </a:r>
+          </a:p>
+          <a:p>
+            <a:pPr lvl="2"/>
+            <a:r>
+              <a:rPr lang="en-US" dirty="0"/>
+              <a:t>Anomaly detection</a:t>
+            </a:r>
+          </a:p>
+          <a:p>
+            <a:pPr lvl="2"/>
+            <a:r>
+              <a:rPr lang="en-US" dirty="0"/>
+              <a:t>Time series analysis, forecasting</a:t>
+            </a:r>
+          </a:p>
+          <a:p>
+            <a:pPr lvl="2"/>
+            <a:r>
+              <a:rPr lang="en-US" dirty="0"/>
+              <a:t>Natural Language Processing</a:t>
+            </a:r>
+          </a:p>
+          <a:p>
+            <a:pPr lvl="2"/>
+            <a:r>
+              <a:rPr lang="en-US" dirty="0"/>
+              <a:t>Deep learning models using Transfer Learning</a:t>
+            </a:r>
+          </a:p>
+          <a:p>
+            <a:pPr lvl="1"/>
+            <a:r>
+              <a:rPr lang="en-US" dirty="0"/>
+              <a:t>Gained experience in</a:t>
+            </a:r>
+          </a:p>
+          <a:p>
+            <a:pPr lvl="2"/>
+            <a:r>
+              <a:rPr lang="en-US" dirty="0"/>
+              <a:t>Google analytics</a:t>
+            </a:r>
+          </a:p>
+          <a:p>
+            <a:pPr lvl="2"/>
+            <a:r>
+              <a:rPr lang="en-US" dirty="0"/>
+              <a:t>Hadoop ecosystem</a:t>
+            </a:r>
+          </a:p>
+          <a:p>
+            <a:pPr lvl="2"/>
+            <a:r>
+              <a:rPr lang="en-US" dirty="0"/>
+              <a:t>Apache Spark</a:t>
+            </a:r>
+          </a:p>
+          <a:p>
+            <a:pPr lvl="2"/>
+            <a:r>
+              <a:rPr lang="en-US" dirty="0"/>
+              <a:t>R ecosystem</a:t>
+            </a:r>
+          </a:p>
+          <a:p>
+            <a:pPr lvl="2"/>
+            <a:r>
+              <a:rPr lang="en-US" dirty="0" err="1"/>
+              <a:t>Jupyter</a:t>
+            </a:r>
+            <a:r>
+              <a:rPr lang="en-US" dirty="0"/>
+              <a:t> notebook, python machine learning stack</a:t>
+            </a:r>
+          </a:p>
+          <a:p>
+            <a:pPr lvl="2"/>
+            <a:r>
+              <a:rPr lang="en-US" dirty="0"/>
+              <a:t>Google TensorFlow Framework</a:t>
+            </a:r>
+          </a:p>
+          <a:p>
+            <a:pPr lvl="2"/>
+            <a:r>
+              <a:rPr lang="en-US" dirty="0"/>
+              <a:t>Adobe Illustrator</a:t>
+            </a:r>
+          </a:p>
+          <a:p>
+            <a:pPr lvl="1"/>
+            <a:endParaRPr lang="en-US" dirty="0"/>
+          </a:p>
+          <a:p>
+            <a:pPr lvl="1"/>
+            <a:endParaRPr lang="en-US" dirty="0"/>
           </a:p>
         </p:txBody>
       </p:sp>
@@ -12017,7 +12751,7 @@
           <a:p>
             <a:r>
               <a:rPr lang="en-US" dirty="0"/>
-              <a:t>How am I taking the learning forward?</a:t>
+              <a:t>How am I taking the learnings forward?</a:t>
             </a:r>
           </a:p>
         </p:txBody>
@@ -12043,7 +12777,26 @@
           <a:bodyPr/>
           <a:lstStyle/>
           <a:p>
-            <a:endParaRPr lang="en-US"/>
+            <a:pPr marL="0" indent="0">
+              <a:buNone/>
+            </a:pPr>
+            <a:r>
+              <a:rPr lang="en-US" dirty="0"/>
+              <a:t>For any software system, eventual cost comes from monitoring and maintenance. The cost comes from noisy monitoring and amount of manual effort goes in investigations.</a:t>
+            </a:r>
+          </a:p>
+          <a:p>
+            <a:pPr marL="0" indent="0">
+              <a:buNone/>
+            </a:pPr>
+            <a:r>
+              <a:rPr lang="en-US" dirty="0"/>
+              <a:t>Software systems produces large, schematized operational data. I would like to leverage the techniques learned in big data processing and anomaly detection to improve software systems operations and reduce the costs involved.</a:t>
+            </a:r>
+          </a:p>
+          <a:p>
+            <a:pPr lvl="1"/>
+            <a:endParaRPr lang="en-US" dirty="0"/>
           </a:p>
         </p:txBody>
       </p:sp>
@@ -12250,7 +13003,7 @@
         <p:spPr/>
         <p:txBody>
           <a:bodyPr>
-            <a:normAutofit fontScale="77500" lnSpcReduction="20000"/>
+            <a:normAutofit fontScale="85000" lnSpcReduction="20000"/>
           </a:bodyPr>
           <a:lstStyle/>
           <a:p>
@@ -12277,6 +13030,20 @@
             <a:pPr lvl="1"/>
             <a:r>
               <a:rPr lang="en-US" dirty="0"/>
+              <a:t>Diploma in Advanced Computing (2003)</a:t>
+            </a:r>
+          </a:p>
+          <a:p>
+            <a:pPr lvl="2"/>
+            <a:r>
+              <a:rPr lang="en-US" dirty="0"/>
+              <a:t>CDAC Bangalore, India</a:t>
+            </a:r>
+          </a:p>
+          <a:p>
+            <a:pPr lvl="1"/>
+            <a:r>
+              <a:rPr lang="en-US" dirty="0"/>
               <a:t>Bachelors in Electrical and Electronics engineering (2002)</a:t>
             </a:r>
           </a:p>
@@ -12288,20 +13055,6 @@
             </a:r>
           </a:p>
           <a:p>
-            <a:pPr lvl="1"/>
-            <a:r>
-              <a:rPr lang="en-US" dirty="0"/>
-              <a:t>Diploma in Advanced Computing (2003)</a:t>
-            </a:r>
-          </a:p>
-          <a:p>
-            <a:pPr lvl="2"/>
-            <a:r>
-              <a:rPr lang="en-US" dirty="0"/>
-              <a:t>CDAC Bangalore, India</a:t>
-            </a:r>
-          </a:p>
-          <a:p>
             <a:r>
               <a:rPr lang="en-US" dirty="0"/>
               <a:t>Work Experience</a:t>
@@ -12354,15 +13107,6 @@
             <a:r>
               <a:rPr lang="en-US" dirty="0"/>
               <a:t>)</a:t>
-            </a:r>
-          </a:p>
-          <a:p>
-            <a:pPr marL="0" indent="0">
-              <a:buNone/>
-            </a:pPr>
-            <a:r>
-              <a:rPr lang="en-US" sz="2000" dirty="0"/>
-              <a:t>LinkedIn: https://www.linkedin.com/in/srihari-busam/</a:t>
             </a:r>
           </a:p>
         </p:txBody>
@@ -17691,7 +18435,65 @@
 </a:theme>
 </file>
 
+<file path=ppt/theme/themeOverride1.xml><?xml version="1.0" encoding="utf-8"?>
+<a:themeOverride xmlns:a="http://schemas.openxmlformats.org/drawingml/2006/main">
+  <a:clrScheme name="Office">
+    <a:dk1>
+      <a:sysClr val="windowText" lastClr="000000"/>
+    </a:dk1>
+    <a:lt1>
+      <a:sysClr val="window" lastClr="FFFFFF"/>
+    </a:lt1>
+    <a:dk2>
+      <a:srgbClr val="44546A"/>
+    </a:dk2>
+    <a:lt2>
+      <a:srgbClr val="E7E6E6"/>
+    </a:lt2>
+    <a:accent1>
+      <a:srgbClr val="4472C4"/>
+    </a:accent1>
+    <a:accent2>
+      <a:srgbClr val="ED7D31"/>
+    </a:accent2>
+    <a:accent3>
+      <a:srgbClr val="A5A5A5"/>
+    </a:accent3>
+    <a:accent4>
+      <a:srgbClr val="FFC000"/>
+    </a:accent4>
+    <a:accent5>
+      <a:srgbClr val="5B9BD5"/>
+    </a:accent5>
+    <a:accent6>
+      <a:srgbClr val="70AD47"/>
+    </a:accent6>
+    <a:hlink>
+      <a:srgbClr val="0563C1"/>
+    </a:hlink>
+    <a:folHlink>
+      <a:srgbClr val="954F72"/>
+    </a:folHlink>
+  </a:clrScheme>
+</a:themeOverride>
+</file>
+
 <file path=customXml/item1.xml><?xml version="1.0" encoding="utf-8"?>
+<p:properties xmlns:p="http://schemas.microsoft.com/office/2006/metadata/properties" xmlns:xsi="http://www.w3.org/2001/XMLSchema-instance" xmlns:pc="http://schemas.microsoft.com/office/infopath/2007/PartnerControls">
+  <documentManagement/>
+</p:properties>
+</file>
+
+<file path=customXml/item2.xml><?xml version="1.0" encoding="utf-8"?>
+<?mso-contentType ?>
+<FormTemplates xmlns="http://schemas.microsoft.com/sharepoint/v3/contenttype/forms">
+  <Display>DocumentLibraryForm</Display>
+  <Edit>DocumentLibraryForm</Edit>
+  <New>DocumentLibraryForm</New>
+</FormTemplates>
+</file>
+
+<file path=customXml/item3.xml><?xml version="1.0" encoding="utf-8"?>
 <ct:contentTypeSchema xmlns:ct="http://schemas.microsoft.com/office/2006/metadata/contentType" xmlns:ma="http://schemas.microsoft.com/office/2006/metadata/properties/metaAttributes" ct:_="" ma:_="" ma:contentTypeName="Document" ma:contentTypeID="0x0101006E7876CE5A991D42848489547AF4CBAE" ma:contentTypeVersion="7" ma:contentTypeDescription="Create a new document." ma:contentTypeScope="" ma:versionID="89cc19e11a35f1f1733091247c63d3c9">
   <xsd:schema xmlns:xsd="http://www.w3.org/2001/XMLSchema" xmlns:xs="http://www.w3.org/2001/XMLSchema" xmlns:p="http://schemas.microsoft.com/office/2006/metadata/properties" xmlns:ns3="7a2312a6-a8c3-41ac-9a29-150ba0710c9a" xmlns:ns4="45cf2939-8fa7-49e3-ad34-0c168c521b81" targetNamespace="http://schemas.microsoft.com/office/2006/metadata/properties" ma:root="true" ma:fieldsID="e83f5769af76e5bf1778458621af7ef9" ns3:_="" ns4:_="">
     <xsd:import namespace="7a2312a6-a8c3-41ac-9a29-150ba0710c9a"/>
@@ -17876,22 +18678,32 @@
 </ct:contentTypeSchema>
 </file>
 
-<file path=customXml/item2.xml><?xml version="1.0" encoding="utf-8"?>
-<?mso-contentType ?>
-<FormTemplates xmlns="http://schemas.microsoft.com/sharepoint/v3/contenttype/forms">
-  <Display>DocumentLibraryForm</Display>
-  <Edit>DocumentLibraryForm</Edit>
-  <New>DocumentLibraryForm</New>
-</FormTemplates>
+<file path=customXml/itemProps1.xml><?xml version="1.0" encoding="utf-8"?>
+<ds:datastoreItem xmlns:ds="http://schemas.openxmlformats.org/officeDocument/2006/customXml" ds:itemID="{B6CAC4AE-67DD-479D-A1E3-723FE1202C57}">
+  <ds:schemaRefs>
+    <ds:schemaRef ds:uri="http://www.w3.org/XML/1998/namespace"/>
+    <ds:schemaRef ds:uri="7a2312a6-a8c3-41ac-9a29-150ba0710c9a"/>
+    <ds:schemaRef ds:uri="http://schemas.microsoft.com/office/2006/documentManagement/types"/>
+    <ds:schemaRef ds:uri="http://purl.org/dc/terms/"/>
+    <ds:schemaRef ds:uri="http://schemas.microsoft.com/office/infopath/2007/PartnerControls"/>
+    <ds:schemaRef ds:uri="http://schemas.openxmlformats.org/package/2006/metadata/core-properties"/>
+    <ds:schemaRef ds:uri="http://purl.org/dc/elements/1.1/"/>
+    <ds:schemaRef ds:uri="45cf2939-8fa7-49e3-ad34-0c168c521b81"/>
+    <ds:schemaRef ds:uri="http://schemas.microsoft.com/office/2006/metadata/properties"/>
+    <ds:schemaRef ds:uri="http://purl.org/dc/dcmitype/"/>
+  </ds:schemaRefs>
+</ds:datastoreItem>
 </file>
 
-<file path=customXml/item3.xml><?xml version="1.0" encoding="utf-8"?>
-<p:properties xmlns:p="http://schemas.microsoft.com/office/2006/metadata/properties" xmlns:xsi="http://www.w3.org/2001/XMLSchema-instance" xmlns:pc="http://schemas.microsoft.com/office/infopath/2007/PartnerControls">
-  <documentManagement/>
-</p:properties>
+<file path=customXml/itemProps2.xml><?xml version="1.0" encoding="utf-8"?>
+<ds:datastoreItem xmlns:ds="http://schemas.openxmlformats.org/officeDocument/2006/customXml" ds:itemID="{42CA6DBA-0F9E-49D4-986C-16023887AF58}">
+  <ds:schemaRefs>
+    <ds:schemaRef ds:uri="http://schemas.microsoft.com/sharepoint/v3/contenttype/forms"/>
+  </ds:schemaRefs>
+</ds:datastoreItem>
 </file>
 
-<file path=customXml/itemProps1.xml><?xml version="1.0" encoding="utf-8"?>
+<file path=customXml/itemProps3.xml><?xml version="1.0" encoding="utf-8"?>
 <ds:datastoreItem xmlns:ds="http://schemas.openxmlformats.org/officeDocument/2006/customXml" ds:itemID="{C2021213-501F-43B0-98F1-FE78227F530C}">
   <ds:schemaRefs>
     <ds:schemaRef ds:uri="http://schemas.microsoft.com/office/2006/metadata/contentType"/>
@@ -17908,29 +18720,4 @@
     <ds:schemaRef ds:uri="http://schemas.microsoft.com/internal/obd"/>
   </ds:schemaRefs>
 </ds:datastoreItem>
-</file>
-
-<file path=customXml/itemProps2.xml><?xml version="1.0" encoding="utf-8"?>
-<ds:datastoreItem xmlns:ds="http://schemas.openxmlformats.org/officeDocument/2006/customXml" ds:itemID="{42CA6DBA-0F9E-49D4-986C-16023887AF58}">
-  <ds:schemaRefs>
-    <ds:schemaRef ds:uri="http://schemas.microsoft.com/sharepoint/v3/contenttype/forms"/>
-  </ds:schemaRefs>
-</ds:datastoreItem>
-</file>
-
-<file path=customXml/itemProps3.xml><?xml version="1.0" encoding="utf-8"?>
-<ds:datastoreItem xmlns:ds="http://schemas.openxmlformats.org/officeDocument/2006/customXml" ds:itemID="{B6CAC4AE-67DD-479D-A1E3-723FE1202C57}">
-  <ds:schemaRefs>
-    <ds:schemaRef ds:uri="http://www.w3.org/XML/1998/namespace"/>
-    <ds:schemaRef ds:uri="7a2312a6-a8c3-41ac-9a29-150ba0710c9a"/>
-    <ds:schemaRef ds:uri="http://schemas.microsoft.com/office/2006/documentManagement/types"/>
-    <ds:schemaRef ds:uri="http://purl.org/dc/terms/"/>
-    <ds:schemaRef ds:uri="http://schemas.microsoft.com/office/infopath/2007/PartnerControls"/>
-    <ds:schemaRef ds:uri="http://schemas.openxmlformats.org/package/2006/metadata/core-properties"/>
-    <ds:schemaRef ds:uri="http://purl.org/dc/elements/1.1/"/>
-    <ds:schemaRef ds:uri="45cf2939-8fa7-49e3-ad34-0c168c521b81"/>
-    <ds:schemaRef ds:uri="http://schemas.microsoft.com/office/2006/metadata/properties"/>
-    <ds:schemaRef ds:uri="http://purl.org/dc/dcmitype/"/>
-  </ds:schemaRefs>
-</ds:datastoreItem>
 </file>
</xml_diff>